<commit_message>
PPT JAVA Dev Software Maio2022
</commit_message>
<xml_diff>
--- a/01 Classes/Aula 10 Desenvolvimento de Software  Java - JS.pptx
+++ b/01 Classes/Aula 10 Desenvolvimento de Software  Java - JS.pptx
@@ -5422,7 +5422,7 @@
                   <a:schemeClr val="bg1"/>
                 </a:solidFill>
               </a:rPr>
-              <a:t>Desenvolvimento de Software</a:t>
+              <a:t>Desenvolvimento de Software  </a:t>
             </a:r>
             <a:br>
               <a:rPr lang="pt-BR" sz="4800" b="1" dirty="0">
@@ -18631,7 +18631,7 @@
               <a:buNone/>
             </a:pPr>
             <a:r>
-              <a:rPr lang="pt-BR" sz="2000" b="1" dirty="0">
+              <a:rPr lang="pt-BR" sz="2400" b="1" dirty="0">
                 <a:solidFill>
                   <a:schemeClr val="tx1"/>
                 </a:solidFill>
@@ -18641,7 +18641,7 @@
               <a:t>// </a:t>
             </a:r>
             <a:r>
-              <a:rPr lang="pt-BR" sz="2000" b="1" dirty="0">
+              <a:rPr lang="pt-BR" sz="2400" b="1" dirty="0">
                 <a:solidFill>
                   <a:schemeClr val="tx1"/>
                 </a:solidFill>
@@ -18651,7 +18651,7 @@
               </a:rPr>
               <a:t>https://viacep.com.br/</a:t>
             </a:r>
-            <a:endParaRPr lang="pt-BR" sz="2000" b="1" dirty="0">
+            <a:endParaRPr lang="pt-BR" sz="2400" b="1" dirty="0">
               <a:solidFill>
                 <a:schemeClr val="tx1"/>
               </a:solidFill>
@@ -18663,7 +18663,7 @@
             <a:pPr marL="0" indent="0" algn="just">
               <a:buNone/>
             </a:pPr>
-            <a:endParaRPr lang="pt-BR" sz="2000" b="1" dirty="0">
+            <a:endParaRPr lang="pt-BR" sz="2400" b="1" dirty="0">
               <a:solidFill>
                 <a:schemeClr val="tx1"/>
               </a:solidFill>
@@ -18676,17 +18676,7 @@
               <a:buNone/>
             </a:pPr>
             <a:r>
-              <a:rPr lang="pt-BR" sz="2000" b="1" dirty="0" err="1">
-                <a:solidFill>
-                  <a:schemeClr val="tx1"/>
-                </a:solidFill>
-                <a:latin typeface="Times New Roman" panose="02020603050405020304" pitchFamily="18" charset="0"/>
-                <a:cs typeface="Times New Roman" panose="02020603050405020304" pitchFamily="18" charset="0"/>
-              </a:rPr>
-              <a:t>const</a:t>
-            </a:r>
-            <a:r>
-              <a:rPr lang="pt-BR" sz="2000" dirty="0">
+              <a:rPr lang="pt-BR" sz="2400" b="1" dirty="0">
                 <a:solidFill>
                   <a:schemeClr val="tx1"/>
                 </a:solidFill>
@@ -18696,37 +18686,62 @@
               <a:t> </a:t>
             </a:r>
             <a:r>
-              <a:rPr lang="pt-BR" sz="2000" dirty="0" err="1">
-                <a:solidFill>
-                  <a:schemeClr val="tx1"/>
-                </a:solidFill>
-                <a:latin typeface="Times New Roman" panose="02020603050405020304" pitchFamily="18" charset="0"/>
-                <a:cs typeface="Times New Roman" panose="02020603050405020304" pitchFamily="18" charset="0"/>
-              </a:rPr>
-              <a:t>ajax</a:t>
-            </a:r>
-            <a:r>
-              <a:rPr lang="pt-BR" sz="2000" dirty="0">
-                <a:solidFill>
-                  <a:schemeClr val="tx1"/>
-                </a:solidFill>
-                <a:latin typeface="Times New Roman" panose="02020603050405020304" pitchFamily="18" charset="0"/>
-                <a:cs typeface="Times New Roman" panose="02020603050405020304" pitchFamily="18" charset="0"/>
-              </a:rPr>
-              <a:t> = </a:t>
-            </a:r>
-            <a:r>
-              <a:rPr lang="pt-BR" sz="2000" b="1" dirty="0">
-                <a:solidFill>
-                  <a:schemeClr val="tx1"/>
-                </a:solidFill>
-                <a:latin typeface="Times New Roman" panose="02020603050405020304" pitchFamily="18" charset="0"/>
-                <a:cs typeface="Times New Roman" panose="02020603050405020304" pitchFamily="18" charset="0"/>
-              </a:rPr>
-              <a:t>new</a:t>
-            </a:r>
-            <a:r>
-              <a:rPr lang="pt-BR" sz="2000" dirty="0">
+              <a:rPr lang="pt-BR" sz="2400" dirty="0">
+                <a:solidFill>
+                  <a:schemeClr val="tx1"/>
+                </a:solidFill>
+                <a:latin typeface="Times New Roman" panose="02020603050405020304" pitchFamily="18" charset="0"/>
+                <a:cs typeface="Times New Roman" panose="02020603050405020304" pitchFamily="18" charset="0"/>
+              </a:rPr>
+              <a:t>&lt;</a:t>
+            </a:r>
+            <a:r>
+              <a:rPr lang="pt-BR" sz="2400" b="1" dirty="0">
+                <a:solidFill>
+                  <a:schemeClr val="tx1"/>
+                </a:solidFill>
+                <a:latin typeface="Times New Roman" panose="02020603050405020304" pitchFamily="18" charset="0"/>
+                <a:cs typeface="Times New Roman" panose="02020603050405020304" pitchFamily="18" charset="0"/>
+              </a:rPr>
+              <a:t>body</a:t>
+            </a:r>
+            <a:r>
+              <a:rPr lang="pt-BR" sz="2400" dirty="0">
+                <a:solidFill>
+                  <a:schemeClr val="tx1"/>
+                </a:solidFill>
+                <a:latin typeface="Times New Roman" panose="02020603050405020304" pitchFamily="18" charset="0"/>
+                <a:cs typeface="Times New Roman" panose="02020603050405020304" pitchFamily="18" charset="0"/>
+              </a:rPr>
+              <a:t>&gt;</a:t>
+            </a:r>
+          </a:p>
+          <a:p>
+            <a:pPr marL="0" indent="0" algn="just">
+              <a:buNone/>
+            </a:pPr>
+            <a:r>
+              <a:rPr lang="pt-BR" sz="2400" dirty="0">
+                <a:solidFill>
+                  <a:schemeClr val="tx1"/>
+                </a:solidFill>
+                <a:latin typeface="Times New Roman" panose="02020603050405020304" pitchFamily="18" charset="0"/>
+                <a:cs typeface="Times New Roman" panose="02020603050405020304" pitchFamily="18" charset="0"/>
+              </a:rPr>
+              <a:t>    &lt;</a:t>
+            </a:r>
+            <a:r>
+              <a:rPr lang="pt-BR" sz="2400" b="1" dirty="0">
+                <a:solidFill>
+                  <a:schemeClr val="tx1"/>
+                </a:solidFill>
+                <a:latin typeface="Times New Roman" panose="02020603050405020304" pitchFamily="18" charset="0"/>
+                <a:cs typeface="Times New Roman" panose="02020603050405020304" pitchFamily="18" charset="0"/>
+              </a:rPr>
+              <a:t>input</a:t>
+            </a:r>
+            <a:r>
+              <a:rPr lang="pt-BR" sz="2400" dirty="0">
                 <a:solidFill>
                   <a:schemeClr val="tx1"/>
                 </a:solidFill>
@@ -18736,162 +18751,107 @@
               <a:t> </a:t>
             </a:r>
             <a:r>
-              <a:rPr lang="pt-BR" sz="2000" b="1" dirty="0" err="1">
+              <a:rPr lang="pt-BR" sz="2400" b="1" dirty="0" err="1">
                 <a:solidFill>
                   <a:srgbClr val="FF0000"/>
                 </a:solidFill>
                 <a:latin typeface="Times New Roman" panose="02020603050405020304" pitchFamily="18" charset="0"/>
                 <a:cs typeface="Times New Roman" panose="02020603050405020304" pitchFamily="18" charset="0"/>
               </a:rPr>
-              <a:t>XMLHttpRequest</a:t>
-            </a:r>
-            <a:r>
-              <a:rPr lang="pt-BR" sz="2000" dirty="0">
-                <a:solidFill>
-                  <a:schemeClr val="tx1"/>
-                </a:solidFill>
-                <a:latin typeface="Times New Roman" panose="02020603050405020304" pitchFamily="18" charset="0"/>
-                <a:cs typeface="Times New Roman" panose="02020603050405020304" pitchFamily="18" charset="0"/>
-              </a:rPr>
-              <a:t>();</a:t>
-            </a:r>
-          </a:p>
-          <a:p>
-            <a:pPr marL="0" indent="0" algn="just">
-              <a:buNone/>
-            </a:pPr>
-            <a:r>
-              <a:rPr lang="pt-BR" sz="2000" dirty="0" err="1">
-                <a:solidFill>
-                  <a:schemeClr val="tx1"/>
-                </a:solidFill>
-                <a:latin typeface="Times New Roman" panose="02020603050405020304" pitchFamily="18" charset="0"/>
-                <a:cs typeface="Times New Roman" panose="02020603050405020304" pitchFamily="18" charset="0"/>
-              </a:rPr>
-              <a:t>ajax.</a:t>
-            </a:r>
-            <a:r>
-              <a:rPr lang="pt-BR" sz="2000" b="1" dirty="0" err="1">
+              <a:t>type</a:t>
+            </a:r>
+            <a:r>
+              <a:rPr lang="pt-BR" sz="2400" dirty="0">
+                <a:solidFill>
+                  <a:schemeClr val="tx1"/>
+                </a:solidFill>
+                <a:latin typeface="Times New Roman" panose="02020603050405020304" pitchFamily="18" charset="0"/>
+                <a:cs typeface="Times New Roman" panose="02020603050405020304" pitchFamily="18" charset="0"/>
+              </a:rPr>
+              <a:t>="</a:t>
+            </a:r>
+            <a:r>
+              <a:rPr lang="pt-BR" sz="2400" b="1" dirty="0" err="1">
+                <a:solidFill>
+                  <a:schemeClr val="tx1"/>
+                </a:solidFill>
+                <a:latin typeface="Times New Roman" panose="02020603050405020304" pitchFamily="18" charset="0"/>
+                <a:cs typeface="Times New Roman" panose="02020603050405020304" pitchFamily="18" charset="0"/>
+              </a:rPr>
+              <a:t>text</a:t>
+            </a:r>
+            <a:r>
+              <a:rPr lang="pt-BR" sz="2400" dirty="0">
+                <a:solidFill>
+                  <a:schemeClr val="tx1"/>
+                </a:solidFill>
+                <a:latin typeface="Times New Roman" panose="02020603050405020304" pitchFamily="18" charset="0"/>
+                <a:cs typeface="Times New Roman" panose="02020603050405020304" pitchFamily="18" charset="0"/>
+              </a:rPr>
+              <a:t>" </a:t>
+            </a:r>
+            <a:r>
+              <a:rPr lang="pt-BR" sz="2400" b="1" dirty="0" err="1">
                 <a:solidFill>
                   <a:srgbClr val="FF0000"/>
                 </a:solidFill>
                 <a:latin typeface="Times New Roman" panose="02020603050405020304" pitchFamily="18" charset="0"/>
                 <a:cs typeface="Times New Roman" panose="02020603050405020304" pitchFamily="18" charset="0"/>
               </a:rPr>
-              <a:t>open</a:t>
-            </a:r>
-            <a:r>
-              <a:rPr lang="pt-BR" sz="2000" dirty="0">
-                <a:solidFill>
-                  <a:schemeClr val="tx1"/>
-                </a:solidFill>
-                <a:latin typeface="Times New Roman" panose="02020603050405020304" pitchFamily="18" charset="0"/>
-                <a:cs typeface="Times New Roman" panose="02020603050405020304" pitchFamily="18" charset="0"/>
-              </a:rPr>
-              <a:t>(‘GET’, ‘</a:t>
-            </a:r>
-            <a:r>
-              <a:rPr lang="pt-BR" sz="2000" b="1" dirty="0">
-                <a:solidFill>
-                  <a:schemeClr val="tx1"/>
-                </a:solidFill>
-                <a:latin typeface="Times New Roman" panose="02020603050405020304" pitchFamily="18" charset="0"/>
-                <a:cs typeface="Times New Roman" panose="02020603050405020304" pitchFamily="18" charset="0"/>
-              </a:rPr>
-              <a:t>https://viacep.com.br/ws/01001000/</a:t>
-            </a:r>
-            <a:r>
-              <a:rPr lang="pt-BR" sz="2000" b="1" dirty="0" err="1">
-                <a:solidFill>
-                  <a:schemeClr val="tx1"/>
-                </a:solidFill>
-                <a:latin typeface="Times New Roman" panose="02020603050405020304" pitchFamily="18" charset="0"/>
-                <a:cs typeface="Times New Roman" panose="02020603050405020304" pitchFamily="18" charset="0"/>
-              </a:rPr>
-              <a:t>json</a:t>
-            </a:r>
-            <a:r>
-              <a:rPr lang="pt-BR" sz="2000" b="1" dirty="0">
-                <a:solidFill>
-                  <a:schemeClr val="tx1"/>
-                </a:solidFill>
-                <a:latin typeface="Times New Roman" panose="02020603050405020304" pitchFamily="18" charset="0"/>
-                <a:cs typeface="Times New Roman" panose="02020603050405020304" pitchFamily="18" charset="0"/>
-              </a:rPr>
-              <a:t>/’</a:t>
-            </a:r>
-            <a:r>
-              <a:rPr lang="pt-BR" sz="2000" dirty="0">
-                <a:solidFill>
-                  <a:schemeClr val="tx1"/>
-                </a:solidFill>
-                <a:latin typeface="Times New Roman" panose="02020603050405020304" pitchFamily="18" charset="0"/>
-                <a:cs typeface="Times New Roman" panose="02020603050405020304" pitchFamily="18" charset="0"/>
-              </a:rPr>
-              <a:t>);</a:t>
-            </a:r>
-          </a:p>
-          <a:p>
-            <a:pPr marL="0" indent="0" algn="just">
-              <a:buNone/>
-            </a:pPr>
-            <a:r>
-              <a:rPr lang="pt-BR" sz="2000" dirty="0" err="1">
-                <a:solidFill>
-                  <a:schemeClr val="tx1"/>
-                </a:solidFill>
-                <a:latin typeface="Times New Roman" panose="02020603050405020304" pitchFamily="18" charset="0"/>
-                <a:cs typeface="Times New Roman" panose="02020603050405020304" pitchFamily="18" charset="0"/>
-              </a:rPr>
-              <a:t>ajax.</a:t>
-            </a:r>
-            <a:r>
-              <a:rPr lang="pt-BR" sz="2000" b="1" dirty="0" err="1">
+              <a:t>name</a:t>
+            </a:r>
+            <a:r>
+              <a:rPr lang="pt-BR" sz="2400" dirty="0">
+                <a:solidFill>
+                  <a:schemeClr val="tx1"/>
+                </a:solidFill>
+                <a:latin typeface="Times New Roman" panose="02020603050405020304" pitchFamily="18" charset="0"/>
+                <a:cs typeface="Times New Roman" panose="02020603050405020304" pitchFamily="18" charset="0"/>
+              </a:rPr>
+              <a:t>=“</a:t>
+            </a:r>
+            <a:r>
+              <a:rPr lang="pt-BR" sz="2400" b="1" dirty="0" err="1">
+                <a:solidFill>
+                  <a:schemeClr val="tx1"/>
+                </a:solidFill>
+                <a:latin typeface="Times New Roman" panose="02020603050405020304" pitchFamily="18" charset="0"/>
+                <a:cs typeface="Times New Roman" panose="02020603050405020304" pitchFamily="18" charset="0"/>
+              </a:rPr>
+              <a:t>idCEP</a:t>
+            </a:r>
+            <a:r>
+              <a:rPr lang="pt-BR" sz="2400" dirty="0">
+                <a:solidFill>
+                  <a:schemeClr val="tx1"/>
+                </a:solidFill>
+                <a:latin typeface="Times New Roman" panose="02020603050405020304" pitchFamily="18" charset="0"/>
+                <a:cs typeface="Times New Roman" panose="02020603050405020304" pitchFamily="18" charset="0"/>
+              </a:rPr>
+              <a:t>" </a:t>
+            </a:r>
+            <a:r>
+              <a:rPr lang="pt-BR" sz="2400" b="1" dirty="0">
                 <a:solidFill>
                   <a:srgbClr val="FF0000"/>
                 </a:solidFill>
                 <a:latin typeface="Times New Roman" panose="02020603050405020304" pitchFamily="18" charset="0"/>
                 <a:cs typeface="Times New Roman" panose="02020603050405020304" pitchFamily="18" charset="0"/>
               </a:rPr>
-              <a:t>send</a:t>
-            </a:r>
-            <a:r>
-              <a:rPr lang="pt-BR" sz="2000" dirty="0">
-                <a:solidFill>
-                  <a:schemeClr val="tx1"/>
-                </a:solidFill>
-                <a:latin typeface="Times New Roman" panose="02020603050405020304" pitchFamily="18" charset="0"/>
-                <a:cs typeface="Times New Roman" panose="02020603050405020304" pitchFamily="18" charset="0"/>
-              </a:rPr>
-              <a:t>();</a:t>
-            </a:r>
-          </a:p>
-          <a:p>
-            <a:pPr marL="0" indent="0" algn="just">
-              <a:buNone/>
-            </a:pPr>
-            <a:r>
-              <a:rPr lang="pt-BR" sz="2000" dirty="0">
-                <a:solidFill>
-                  <a:schemeClr val="tx1"/>
-                </a:solidFill>
-                <a:latin typeface="Times New Roman" panose="02020603050405020304" pitchFamily="18" charset="0"/>
-                <a:cs typeface="Times New Roman" panose="02020603050405020304" pitchFamily="18" charset="0"/>
-              </a:rPr>
-              <a:t>	// incluir na </a:t>
-            </a:r>
-            <a:r>
-              <a:rPr lang="pt-BR" sz="2000" b="1" dirty="0" err="1">
-                <a:solidFill>
-                  <a:schemeClr val="tx1"/>
-                </a:solidFill>
-                <a:latin typeface="Times New Roman" panose="02020603050405020304" pitchFamily="18" charset="0"/>
-                <a:cs typeface="Times New Roman" panose="02020603050405020304" pitchFamily="18" charset="0"/>
-              </a:rPr>
-              <a:t>tag</a:t>
-            </a:r>
-            <a:r>
-              <a:rPr lang="pt-BR" sz="2000" dirty="0">
+              <a:t>id</a:t>
+            </a:r>
+            <a:r>
+              <a:rPr lang="pt-BR" sz="2400" dirty="0">
+                <a:solidFill>
+                  <a:schemeClr val="tx1"/>
+                </a:solidFill>
+                <a:latin typeface="Times New Roman" panose="02020603050405020304" pitchFamily="18" charset="0"/>
+                <a:cs typeface="Times New Roman" panose="02020603050405020304" pitchFamily="18" charset="0"/>
+              </a:rPr>
+              <a:t>="</a:t>
+            </a:r>
+            <a:r>
+              <a:rPr lang="pt-BR" sz="2400" b="1" dirty="0">
                 <a:solidFill>
                   <a:schemeClr val="tx1"/>
                 </a:solidFill>
@@ -18901,7 +18861,187 @@
               <a:t> </a:t>
             </a:r>
             <a:r>
-              <a:rPr lang="pt-BR" sz="2000" dirty="0" err="1">
+              <a:rPr lang="pt-BR" sz="2400" b="1" dirty="0" err="1">
+                <a:solidFill>
+                  <a:schemeClr val="tx1"/>
+                </a:solidFill>
+                <a:latin typeface="Times New Roman" panose="02020603050405020304" pitchFamily="18" charset="0"/>
+                <a:cs typeface="Times New Roman" panose="02020603050405020304" pitchFamily="18" charset="0"/>
+              </a:rPr>
+              <a:t>idCEP</a:t>
+            </a:r>
+            <a:r>
+              <a:rPr lang="pt-BR" sz="2400" dirty="0">
+                <a:solidFill>
+                  <a:schemeClr val="tx1"/>
+                </a:solidFill>
+                <a:latin typeface="Times New Roman" panose="02020603050405020304" pitchFamily="18" charset="0"/>
+                <a:cs typeface="Times New Roman" panose="02020603050405020304" pitchFamily="18" charset="0"/>
+              </a:rPr>
+              <a:t>" /&gt;</a:t>
+            </a:r>
+          </a:p>
+          <a:p>
+            <a:pPr marL="0" indent="0" algn="just">
+              <a:buNone/>
+            </a:pPr>
+            <a:r>
+              <a:rPr lang="pt-BR" sz="2400" dirty="0">
+                <a:solidFill>
+                  <a:schemeClr val="tx1"/>
+                </a:solidFill>
+                <a:latin typeface="Times New Roman" panose="02020603050405020304" pitchFamily="18" charset="0"/>
+                <a:cs typeface="Times New Roman" panose="02020603050405020304" pitchFamily="18" charset="0"/>
+              </a:rPr>
+              <a:t>    &lt;</a:t>
+            </a:r>
+            <a:r>
+              <a:rPr lang="pt-BR" sz="2400" b="1" dirty="0">
+                <a:solidFill>
+                  <a:schemeClr val="tx1"/>
+                </a:solidFill>
+                <a:latin typeface="Times New Roman" panose="02020603050405020304" pitchFamily="18" charset="0"/>
+                <a:cs typeface="Times New Roman" panose="02020603050405020304" pitchFamily="18" charset="0"/>
+              </a:rPr>
+              <a:t>input</a:t>
+            </a:r>
+            <a:r>
+              <a:rPr lang="pt-BR" sz="2400" dirty="0">
+                <a:solidFill>
+                  <a:schemeClr val="tx1"/>
+                </a:solidFill>
+                <a:latin typeface="Times New Roman" panose="02020603050405020304" pitchFamily="18" charset="0"/>
+                <a:cs typeface="Times New Roman" panose="02020603050405020304" pitchFamily="18" charset="0"/>
+              </a:rPr>
+              <a:t> </a:t>
+            </a:r>
+            <a:r>
+              <a:rPr lang="pt-BR" sz="2400" b="1" dirty="0" err="1">
+                <a:solidFill>
+                  <a:srgbClr val="FF0000"/>
+                </a:solidFill>
+                <a:latin typeface="Times New Roman" panose="02020603050405020304" pitchFamily="18" charset="0"/>
+                <a:cs typeface="Times New Roman" panose="02020603050405020304" pitchFamily="18" charset="0"/>
+              </a:rPr>
+              <a:t>type</a:t>
+            </a:r>
+            <a:r>
+              <a:rPr lang="pt-BR" sz="2400" dirty="0">
+                <a:solidFill>
+                  <a:schemeClr val="tx1"/>
+                </a:solidFill>
+                <a:latin typeface="Times New Roman" panose="02020603050405020304" pitchFamily="18" charset="0"/>
+                <a:cs typeface="Times New Roman" panose="02020603050405020304" pitchFamily="18" charset="0"/>
+              </a:rPr>
+              <a:t>="</a:t>
+            </a:r>
+            <a:r>
+              <a:rPr lang="pt-BR" sz="2400" b="1" dirty="0" err="1">
+                <a:solidFill>
+                  <a:schemeClr val="tx1"/>
+                </a:solidFill>
+                <a:latin typeface="Times New Roman" panose="02020603050405020304" pitchFamily="18" charset="0"/>
+                <a:cs typeface="Times New Roman" panose="02020603050405020304" pitchFamily="18" charset="0"/>
+              </a:rPr>
+              <a:t>button</a:t>
+            </a:r>
+            <a:r>
+              <a:rPr lang="pt-BR" sz="2400" dirty="0">
+                <a:solidFill>
+                  <a:schemeClr val="tx1"/>
+                </a:solidFill>
+                <a:latin typeface="Times New Roman" panose="02020603050405020304" pitchFamily="18" charset="0"/>
+                <a:cs typeface="Times New Roman" panose="02020603050405020304" pitchFamily="18" charset="0"/>
+              </a:rPr>
+              <a:t>" </a:t>
+            </a:r>
+            <a:r>
+              <a:rPr lang="pt-BR" sz="2400" b="1" dirty="0" err="1">
+                <a:solidFill>
+                  <a:srgbClr val="FF0000"/>
+                </a:solidFill>
+                <a:latin typeface="Times New Roman" panose="02020603050405020304" pitchFamily="18" charset="0"/>
+                <a:cs typeface="Times New Roman" panose="02020603050405020304" pitchFamily="18" charset="0"/>
+              </a:rPr>
+              <a:t>value</a:t>
+            </a:r>
+            <a:r>
+              <a:rPr lang="pt-BR" sz="2400" dirty="0">
+                <a:solidFill>
+                  <a:schemeClr val="tx1"/>
+                </a:solidFill>
+                <a:latin typeface="Times New Roman" panose="02020603050405020304" pitchFamily="18" charset="0"/>
+                <a:cs typeface="Times New Roman" panose="02020603050405020304" pitchFamily="18" charset="0"/>
+              </a:rPr>
+              <a:t>="Buscar" </a:t>
+            </a:r>
+            <a:r>
+              <a:rPr lang="pt-BR" sz="2400" b="1" dirty="0" err="1">
+                <a:solidFill>
+                  <a:srgbClr val="FF0000"/>
+                </a:solidFill>
+                <a:latin typeface="Times New Roman" panose="02020603050405020304" pitchFamily="18" charset="0"/>
+                <a:cs typeface="Times New Roman" panose="02020603050405020304" pitchFamily="18" charset="0"/>
+              </a:rPr>
+              <a:t>onclick</a:t>
+            </a:r>
+            <a:r>
+              <a:rPr lang="pt-BR" sz="2400" dirty="0">
+                <a:solidFill>
+                  <a:schemeClr val="tx1"/>
+                </a:solidFill>
+                <a:latin typeface="Times New Roman" panose="02020603050405020304" pitchFamily="18" charset="0"/>
+                <a:cs typeface="Times New Roman" panose="02020603050405020304" pitchFamily="18" charset="0"/>
+              </a:rPr>
+              <a:t>="</a:t>
+            </a:r>
+            <a:r>
+              <a:rPr lang="pt-BR" sz="2400" b="1" dirty="0" err="1">
+                <a:solidFill>
+                  <a:schemeClr val="tx1"/>
+                </a:solidFill>
+                <a:latin typeface="Times New Roman" panose="02020603050405020304" pitchFamily="18" charset="0"/>
+                <a:cs typeface="Times New Roman" panose="02020603050405020304" pitchFamily="18" charset="0"/>
+              </a:rPr>
+              <a:t>buscarCEP</a:t>
+            </a:r>
+            <a:r>
+              <a:rPr lang="pt-BR" sz="2400" b="1" dirty="0">
+                <a:solidFill>
+                  <a:schemeClr val="tx1"/>
+                </a:solidFill>
+                <a:latin typeface="Times New Roman" panose="02020603050405020304" pitchFamily="18" charset="0"/>
+                <a:cs typeface="Times New Roman" panose="02020603050405020304" pitchFamily="18" charset="0"/>
+              </a:rPr>
+              <a:t>( )</a:t>
+            </a:r>
+            <a:r>
+              <a:rPr lang="pt-BR" sz="2400" dirty="0">
+                <a:solidFill>
+                  <a:schemeClr val="tx1"/>
+                </a:solidFill>
+                <a:latin typeface="Times New Roman" panose="02020603050405020304" pitchFamily="18" charset="0"/>
+                <a:cs typeface="Times New Roman" panose="02020603050405020304" pitchFamily="18" charset="0"/>
+              </a:rPr>
+              <a:t>" /&gt;</a:t>
+            </a:r>
+          </a:p>
+          <a:p>
+            <a:pPr marL="0" indent="0" algn="just">
+              <a:buNone/>
+            </a:pPr>
+            <a:r>
+              <a:rPr lang="pt-BR" sz="2400" dirty="0">
+                <a:solidFill>
+                  <a:schemeClr val="tx1"/>
+                </a:solidFill>
+                <a:latin typeface="Times New Roman" panose="02020603050405020304" pitchFamily="18" charset="0"/>
+                <a:cs typeface="Times New Roman" panose="02020603050405020304" pitchFamily="18" charset="0"/>
+              </a:rPr>
+              <a:t>    &lt;</a:t>
+            </a:r>
+            <a:r>
+              <a:rPr lang="pt-BR" sz="2400" b="1" dirty="0" err="1">
                 <a:solidFill>
                   <a:schemeClr val="tx1"/>
                 </a:solidFill>
@@ -18911,397 +19051,165 @@
               <a:t>pre</a:t>
             </a:r>
             <a:r>
-              <a:rPr lang="pt-BR" sz="2000" dirty="0">
-                <a:solidFill>
-                  <a:schemeClr val="tx1"/>
-                </a:solidFill>
-                <a:latin typeface="Times New Roman" panose="02020603050405020304" pitchFamily="18" charset="0"/>
-                <a:cs typeface="Times New Roman" panose="02020603050405020304" pitchFamily="18" charset="0"/>
-              </a:rPr>
-              <a:t> ou p</a:t>
-            </a:r>
-          </a:p>
-          <a:p>
-            <a:pPr marL="0" indent="0" algn="just">
-              <a:buNone/>
-            </a:pPr>
-            <a:r>
-              <a:rPr lang="pt-BR" sz="2000" dirty="0" err="1">
-                <a:solidFill>
-                  <a:schemeClr val="tx1"/>
-                </a:solidFill>
-                <a:latin typeface="Times New Roman" panose="02020603050405020304" pitchFamily="18" charset="0"/>
-                <a:cs typeface="Times New Roman" panose="02020603050405020304" pitchFamily="18" charset="0"/>
-              </a:rPr>
-              <a:t>ajax.</a:t>
-            </a:r>
-            <a:r>
-              <a:rPr lang="pt-BR" sz="2000" b="1" dirty="0" err="1">
+              <a:rPr lang="pt-BR" sz="2400" dirty="0">
+                <a:solidFill>
+                  <a:schemeClr val="tx1"/>
+                </a:solidFill>
+                <a:latin typeface="Times New Roman" panose="02020603050405020304" pitchFamily="18" charset="0"/>
+                <a:cs typeface="Times New Roman" panose="02020603050405020304" pitchFamily="18" charset="0"/>
+              </a:rPr>
+              <a:t> </a:t>
+            </a:r>
+            <a:r>
+              <a:rPr lang="pt-BR" sz="2400" b="1" dirty="0">
+                <a:solidFill>
+                  <a:schemeClr val="tx1"/>
+                </a:solidFill>
+                <a:latin typeface="Times New Roman" panose="02020603050405020304" pitchFamily="18" charset="0"/>
+                <a:cs typeface="Times New Roman" panose="02020603050405020304" pitchFamily="18" charset="0"/>
+              </a:rPr>
+              <a:t>id</a:t>
+            </a:r>
+            <a:r>
+              <a:rPr lang="pt-BR" sz="2400" dirty="0">
+                <a:solidFill>
+                  <a:schemeClr val="tx1"/>
+                </a:solidFill>
+                <a:latin typeface="Times New Roman" panose="02020603050405020304" pitchFamily="18" charset="0"/>
+                <a:cs typeface="Times New Roman" panose="02020603050405020304" pitchFamily="18" charset="0"/>
+              </a:rPr>
+              <a:t>=“</a:t>
+            </a:r>
+            <a:r>
+              <a:rPr lang="pt-BR" sz="2400" b="1" dirty="0" err="1">
                 <a:solidFill>
                   <a:srgbClr val="FF0000"/>
                 </a:solidFill>
                 <a:latin typeface="Times New Roman" panose="02020603050405020304" pitchFamily="18" charset="0"/>
                 <a:cs typeface="Times New Roman" panose="02020603050405020304" pitchFamily="18" charset="0"/>
               </a:rPr>
-              <a:t>onload</a:t>
-            </a:r>
-            <a:r>
-              <a:rPr lang="pt-BR" sz="2000" dirty="0">
-                <a:solidFill>
-                  <a:schemeClr val="tx1"/>
-                </a:solidFill>
-                <a:latin typeface="Times New Roman" panose="02020603050405020304" pitchFamily="18" charset="0"/>
-                <a:cs typeface="Times New Roman" panose="02020603050405020304" pitchFamily="18" charset="0"/>
-              </a:rPr>
-              <a:t> = </a:t>
-            </a:r>
-            <a:r>
-              <a:rPr lang="pt-BR" sz="2000" b="1" dirty="0" err="1">
-                <a:solidFill>
-                  <a:schemeClr val="tx1"/>
-                </a:solidFill>
-                <a:latin typeface="Times New Roman" panose="02020603050405020304" pitchFamily="18" charset="0"/>
-                <a:cs typeface="Times New Roman" panose="02020603050405020304" pitchFamily="18" charset="0"/>
-              </a:rPr>
-              <a:t>function</a:t>
-            </a:r>
-            <a:r>
-              <a:rPr lang="pt-BR" sz="2000" dirty="0">
-                <a:solidFill>
-                  <a:schemeClr val="tx1"/>
-                </a:solidFill>
-                <a:latin typeface="Times New Roman" panose="02020603050405020304" pitchFamily="18" charset="0"/>
-                <a:cs typeface="Times New Roman" panose="02020603050405020304" pitchFamily="18" charset="0"/>
-              </a:rPr>
-              <a:t>(){  </a:t>
-            </a:r>
-          </a:p>
-          <a:p>
-            <a:pPr marL="0" indent="0" algn="just">
-              <a:buNone/>
-            </a:pPr>
-            <a:r>
-              <a:rPr lang="pt-BR" sz="2000" dirty="0">
-                <a:solidFill>
-                  <a:schemeClr val="tx1"/>
-                </a:solidFill>
-                <a:latin typeface="Times New Roman" panose="02020603050405020304" pitchFamily="18" charset="0"/>
-                <a:cs typeface="Times New Roman" panose="02020603050405020304" pitchFamily="18" charset="0"/>
-              </a:rPr>
-              <a:t>		</a:t>
-            </a:r>
-            <a:r>
-              <a:rPr lang="pt-BR" sz="2000" b="1" dirty="0" err="1">
-                <a:solidFill>
-                  <a:schemeClr val="tx1"/>
-                </a:solidFill>
-                <a:latin typeface="Times New Roman" panose="02020603050405020304" pitchFamily="18" charset="0"/>
-                <a:cs typeface="Times New Roman" panose="02020603050405020304" pitchFamily="18" charset="0"/>
-              </a:rPr>
-              <a:t>document</a:t>
-            </a:r>
-            <a:r>
-              <a:rPr lang="pt-BR" sz="2000" dirty="0" err="1">
-                <a:solidFill>
-                  <a:schemeClr val="tx1"/>
-                </a:solidFill>
-                <a:latin typeface="Times New Roman" panose="02020603050405020304" pitchFamily="18" charset="0"/>
-                <a:cs typeface="Times New Roman" panose="02020603050405020304" pitchFamily="18" charset="0"/>
-              </a:rPr>
-              <a:t>.</a:t>
-            </a:r>
-            <a:r>
-              <a:rPr lang="pt-BR" sz="2000" b="1" dirty="0" err="1">
-                <a:solidFill>
-                  <a:srgbClr val="FF0000"/>
-                </a:solidFill>
-                <a:latin typeface="Times New Roman" panose="02020603050405020304" pitchFamily="18" charset="0"/>
-                <a:cs typeface="Times New Roman" panose="02020603050405020304" pitchFamily="18" charset="0"/>
-              </a:rPr>
-              <a:t>getElementById</a:t>
-            </a:r>
-            <a:r>
-              <a:rPr lang="pt-BR" sz="2000" dirty="0">
-                <a:solidFill>
-                  <a:schemeClr val="tx1"/>
-                </a:solidFill>
-                <a:latin typeface="Times New Roman" panose="02020603050405020304" pitchFamily="18" charset="0"/>
-                <a:cs typeface="Times New Roman" panose="02020603050405020304" pitchFamily="18" charset="0"/>
-              </a:rPr>
-              <a:t>(“</a:t>
-            </a:r>
-            <a:r>
-              <a:rPr lang="pt-BR" sz="2000" b="1" dirty="0" err="1">
-                <a:solidFill>
-                  <a:schemeClr val="tx1"/>
-                </a:solidFill>
-                <a:latin typeface="Times New Roman" panose="02020603050405020304" pitchFamily="18" charset="0"/>
-                <a:cs typeface="Times New Roman" panose="02020603050405020304" pitchFamily="18" charset="0"/>
-              </a:rPr>
-              <a:t>IdArea</a:t>
-            </a:r>
-            <a:r>
-              <a:rPr lang="pt-BR" sz="2000" dirty="0">
-                <a:solidFill>
-                  <a:schemeClr val="tx1"/>
-                </a:solidFill>
-                <a:latin typeface="Times New Roman" panose="02020603050405020304" pitchFamily="18" charset="0"/>
-                <a:cs typeface="Times New Roman" panose="02020603050405020304" pitchFamily="18" charset="0"/>
-              </a:rPr>
-              <a:t>”).</a:t>
-            </a:r>
-            <a:r>
-              <a:rPr lang="pt-BR" sz="2000" dirty="0" err="1">
-                <a:solidFill>
-                  <a:schemeClr val="tx1"/>
-                </a:solidFill>
-                <a:latin typeface="Times New Roman" panose="02020603050405020304" pitchFamily="18" charset="0"/>
-                <a:cs typeface="Times New Roman" panose="02020603050405020304" pitchFamily="18" charset="0"/>
-              </a:rPr>
-              <a:t>innerHTML</a:t>
-            </a:r>
-            <a:r>
-              <a:rPr lang="pt-BR" sz="2000" dirty="0">
-                <a:solidFill>
-                  <a:schemeClr val="tx1"/>
-                </a:solidFill>
-                <a:latin typeface="Times New Roman" panose="02020603050405020304" pitchFamily="18" charset="0"/>
-                <a:cs typeface="Times New Roman" panose="02020603050405020304" pitchFamily="18" charset="0"/>
-              </a:rPr>
-              <a:t> = </a:t>
-            </a:r>
-            <a:r>
-              <a:rPr lang="pt-BR" sz="2000" b="1" dirty="0" err="1">
-                <a:solidFill>
-                  <a:schemeClr val="tx1"/>
-                </a:solidFill>
-                <a:latin typeface="Times New Roman" panose="02020603050405020304" pitchFamily="18" charset="0"/>
-                <a:cs typeface="Times New Roman" panose="02020603050405020304" pitchFamily="18" charset="0"/>
-              </a:rPr>
-              <a:t>this</a:t>
-            </a:r>
-            <a:r>
-              <a:rPr lang="pt-BR" sz="2000" dirty="0" err="1">
-                <a:solidFill>
-                  <a:schemeClr val="tx1"/>
-                </a:solidFill>
-                <a:latin typeface="Times New Roman" panose="02020603050405020304" pitchFamily="18" charset="0"/>
-                <a:cs typeface="Times New Roman" panose="02020603050405020304" pitchFamily="18" charset="0"/>
-              </a:rPr>
-              <a:t>.responseText</a:t>
-            </a:r>
-            <a:r>
-              <a:rPr lang="pt-BR" sz="2000" dirty="0">
-                <a:solidFill>
-                  <a:schemeClr val="tx1"/>
-                </a:solidFill>
-                <a:latin typeface="Times New Roman" panose="02020603050405020304" pitchFamily="18" charset="0"/>
-                <a:cs typeface="Times New Roman" panose="02020603050405020304" pitchFamily="18" charset="0"/>
-              </a:rPr>
-              <a:t>;</a:t>
-            </a:r>
-          </a:p>
-          <a:p>
-            <a:pPr marL="0" indent="0" algn="just">
-              <a:buNone/>
-            </a:pPr>
-            <a:r>
-              <a:rPr lang="pt-BR" sz="2000" b="1" dirty="0">
-                <a:solidFill>
-                  <a:schemeClr val="tx1"/>
-                </a:solidFill>
-                <a:latin typeface="Times New Roman" panose="02020603050405020304" pitchFamily="18" charset="0"/>
-                <a:cs typeface="Times New Roman" panose="02020603050405020304" pitchFamily="18" charset="0"/>
-              </a:rPr>
-              <a:t>		</a:t>
-            </a:r>
-            <a:r>
-              <a:rPr lang="pt-BR" sz="2000" b="1" dirty="0" err="1">
-                <a:solidFill>
-                  <a:schemeClr val="tx1"/>
-                </a:solidFill>
-                <a:latin typeface="Times New Roman" panose="02020603050405020304" pitchFamily="18" charset="0"/>
-                <a:cs typeface="Times New Roman" panose="02020603050405020304" pitchFamily="18" charset="0"/>
-              </a:rPr>
-              <a:t>let</a:t>
-            </a:r>
-            <a:r>
-              <a:rPr lang="pt-BR" sz="2000" dirty="0">
-                <a:solidFill>
-                  <a:schemeClr val="tx1"/>
-                </a:solidFill>
-                <a:latin typeface="Times New Roman" panose="02020603050405020304" pitchFamily="18" charset="0"/>
-                <a:cs typeface="Times New Roman" panose="02020603050405020304" pitchFamily="18" charset="0"/>
-              </a:rPr>
-              <a:t> </a:t>
-            </a:r>
-            <a:r>
-              <a:rPr lang="pt-BR" sz="2000" b="1" dirty="0" err="1">
-                <a:solidFill>
-                  <a:srgbClr val="FF0000"/>
-                </a:solidFill>
-                <a:latin typeface="Times New Roman" panose="02020603050405020304" pitchFamily="18" charset="0"/>
-                <a:cs typeface="Times New Roman" panose="02020603050405020304" pitchFamily="18" charset="0"/>
-              </a:rPr>
-              <a:t>objCEP</a:t>
-            </a:r>
-            <a:r>
-              <a:rPr lang="pt-BR" sz="2000" dirty="0">
-                <a:solidFill>
-                  <a:schemeClr val="tx1"/>
-                </a:solidFill>
-                <a:latin typeface="Times New Roman" panose="02020603050405020304" pitchFamily="18" charset="0"/>
-                <a:cs typeface="Times New Roman" panose="02020603050405020304" pitchFamily="18" charset="0"/>
-              </a:rPr>
-              <a:t> = </a:t>
-            </a:r>
-            <a:r>
-              <a:rPr lang="pt-BR" sz="2000" b="1" dirty="0" err="1">
-                <a:solidFill>
-                  <a:schemeClr val="tx1"/>
-                </a:solidFill>
-                <a:latin typeface="Times New Roman" panose="02020603050405020304" pitchFamily="18" charset="0"/>
-                <a:cs typeface="Times New Roman" panose="02020603050405020304" pitchFamily="18" charset="0"/>
-              </a:rPr>
-              <a:t>JSON</a:t>
-            </a:r>
-            <a:r>
-              <a:rPr lang="pt-BR" sz="2000" dirty="0" err="1">
-                <a:solidFill>
-                  <a:schemeClr val="tx1"/>
-                </a:solidFill>
-                <a:latin typeface="Times New Roman" panose="02020603050405020304" pitchFamily="18" charset="0"/>
-                <a:cs typeface="Times New Roman" panose="02020603050405020304" pitchFamily="18" charset="0"/>
-              </a:rPr>
-              <a:t>.</a:t>
-            </a:r>
-            <a:r>
-              <a:rPr lang="pt-BR" sz="2000" b="1" dirty="0" err="1">
-                <a:solidFill>
-                  <a:srgbClr val="FF0000"/>
-                </a:solidFill>
-                <a:latin typeface="Times New Roman" panose="02020603050405020304" pitchFamily="18" charset="0"/>
-                <a:cs typeface="Times New Roman" panose="02020603050405020304" pitchFamily="18" charset="0"/>
-              </a:rPr>
-              <a:t>parse</a:t>
-            </a:r>
-            <a:r>
-              <a:rPr lang="pt-BR" sz="2000" dirty="0">
-                <a:solidFill>
-                  <a:schemeClr val="tx1"/>
-                </a:solidFill>
-                <a:latin typeface="Times New Roman" panose="02020603050405020304" pitchFamily="18" charset="0"/>
-                <a:cs typeface="Times New Roman" panose="02020603050405020304" pitchFamily="18" charset="0"/>
-              </a:rPr>
-              <a:t>(</a:t>
-            </a:r>
-            <a:r>
-              <a:rPr lang="pt-BR" sz="2000" b="1" dirty="0" err="1">
-                <a:solidFill>
-                  <a:schemeClr val="tx1"/>
-                </a:solidFill>
-                <a:latin typeface="Times New Roman" panose="02020603050405020304" pitchFamily="18" charset="0"/>
-                <a:cs typeface="Times New Roman" panose="02020603050405020304" pitchFamily="18" charset="0"/>
-              </a:rPr>
-              <a:t>this</a:t>
-            </a:r>
-            <a:r>
-              <a:rPr lang="pt-BR" sz="2000" dirty="0" err="1">
-                <a:solidFill>
-                  <a:schemeClr val="tx1"/>
-                </a:solidFill>
-                <a:latin typeface="Times New Roman" panose="02020603050405020304" pitchFamily="18" charset="0"/>
-                <a:cs typeface="Times New Roman" panose="02020603050405020304" pitchFamily="18" charset="0"/>
-              </a:rPr>
-              <a:t>.responseText</a:t>
-            </a:r>
-            <a:r>
-              <a:rPr lang="pt-BR" sz="2000" dirty="0">
-                <a:solidFill>
-                  <a:schemeClr val="tx1"/>
-                </a:solidFill>
-                <a:latin typeface="Times New Roman" panose="02020603050405020304" pitchFamily="18" charset="0"/>
-                <a:cs typeface="Times New Roman" panose="02020603050405020304" pitchFamily="18" charset="0"/>
-              </a:rPr>
-              <a:t>);</a:t>
-            </a:r>
-          </a:p>
-          <a:p>
-            <a:pPr marL="0" indent="0" algn="just">
-              <a:buNone/>
-            </a:pPr>
-            <a:r>
-              <a:rPr lang="pt-BR" sz="2000" dirty="0">
-                <a:solidFill>
-                  <a:schemeClr val="tx1"/>
-                </a:solidFill>
-                <a:latin typeface="Times New Roman" panose="02020603050405020304" pitchFamily="18" charset="0"/>
-                <a:cs typeface="Times New Roman" panose="02020603050405020304" pitchFamily="18" charset="0"/>
-              </a:rPr>
-              <a:t>		</a:t>
-            </a:r>
-            <a:r>
-              <a:rPr lang="pt-BR" sz="2000" b="1" dirty="0" err="1">
-                <a:solidFill>
-                  <a:schemeClr val="tx1"/>
-                </a:solidFill>
-                <a:latin typeface="Times New Roman" panose="02020603050405020304" pitchFamily="18" charset="0"/>
-                <a:cs typeface="Times New Roman" panose="02020603050405020304" pitchFamily="18" charset="0"/>
-              </a:rPr>
-              <a:t>alert</a:t>
-            </a:r>
-            <a:r>
-              <a:rPr lang="pt-BR" sz="2000" dirty="0">
-                <a:solidFill>
-                  <a:schemeClr val="tx1"/>
-                </a:solidFill>
-                <a:latin typeface="Times New Roman" panose="02020603050405020304" pitchFamily="18" charset="0"/>
-                <a:cs typeface="Times New Roman" panose="02020603050405020304" pitchFamily="18" charset="0"/>
-              </a:rPr>
-              <a:t>(</a:t>
-            </a:r>
-            <a:r>
-              <a:rPr lang="pt-BR" sz="2000" b="1" dirty="0" err="1">
-                <a:solidFill>
-                  <a:srgbClr val="FF0000"/>
-                </a:solidFill>
-                <a:latin typeface="Times New Roman" panose="02020603050405020304" pitchFamily="18" charset="0"/>
-                <a:cs typeface="Times New Roman" panose="02020603050405020304" pitchFamily="18" charset="0"/>
-              </a:rPr>
-              <a:t>objCEP.</a:t>
-            </a:r>
-            <a:r>
-              <a:rPr lang="pt-BR" sz="2000" b="1" dirty="0" err="1">
-                <a:solidFill>
-                  <a:schemeClr val="tx1"/>
-                </a:solidFill>
-                <a:latin typeface="Times New Roman" panose="02020603050405020304" pitchFamily="18" charset="0"/>
-                <a:cs typeface="Times New Roman" panose="02020603050405020304" pitchFamily="18" charset="0"/>
-              </a:rPr>
-              <a:t>bairro</a:t>
-            </a:r>
-            <a:r>
-              <a:rPr lang="pt-BR" sz="2000" dirty="0">
-                <a:solidFill>
-                  <a:schemeClr val="tx1"/>
-                </a:solidFill>
-                <a:latin typeface="Times New Roman" panose="02020603050405020304" pitchFamily="18" charset="0"/>
-                <a:cs typeface="Times New Roman" panose="02020603050405020304" pitchFamily="18" charset="0"/>
-              </a:rPr>
-              <a:t>); }</a:t>
-            </a:r>
-          </a:p>
-          <a:p>
-            <a:pPr marL="0" indent="0" algn="just">
-              <a:buNone/>
-            </a:pPr>
-            <a:endParaRPr lang="pt-BR" sz="2000" dirty="0">
-              <a:solidFill>
-                <a:schemeClr val="tx1"/>
-              </a:solidFill>
-              <a:latin typeface="Times New Roman" panose="02020603050405020304" pitchFamily="18" charset="0"/>
-              <a:cs typeface="Times New Roman" panose="02020603050405020304" pitchFamily="18" charset="0"/>
-            </a:endParaRPr>
+              <a:t>idArea</a:t>
+            </a:r>
+            <a:r>
+              <a:rPr lang="pt-BR" sz="2400" dirty="0">
+                <a:solidFill>
+                  <a:schemeClr val="tx1"/>
+                </a:solidFill>
+                <a:latin typeface="Times New Roman" panose="02020603050405020304" pitchFamily="18" charset="0"/>
+                <a:cs typeface="Times New Roman" panose="02020603050405020304" pitchFamily="18" charset="0"/>
+              </a:rPr>
+              <a:t>"&gt;&lt;/</a:t>
+            </a:r>
+            <a:r>
+              <a:rPr lang="pt-BR" sz="2400" dirty="0" err="1">
+                <a:solidFill>
+                  <a:schemeClr val="tx1"/>
+                </a:solidFill>
+                <a:latin typeface="Times New Roman" panose="02020603050405020304" pitchFamily="18" charset="0"/>
+                <a:cs typeface="Times New Roman" panose="02020603050405020304" pitchFamily="18" charset="0"/>
+              </a:rPr>
+              <a:t>pre</a:t>
+            </a:r>
+            <a:r>
+              <a:rPr lang="pt-BR" sz="2400" dirty="0">
+                <a:solidFill>
+                  <a:schemeClr val="tx1"/>
+                </a:solidFill>
+                <a:latin typeface="Times New Roman" panose="02020603050405020304" pitchFamily="18" charset="0"/>
+                <a:cs typeface="Times New Roman" panose="02020603050405020304" pitchFamily="18" charset="0"/>
+              </a:rPr>
+              <a:t>&gt;</a:t>
+            </a:r>
+          </a:p>
+          <a:p>
+            <a:pPr marL="0" indent="0" algn="just">
+              <a:buNone/>
+            </a:pPr>
+            <a:r>
+              <a:rPr lang="pt-BR" sz="2400" dirty="0">
+                <a:solidFill>
+                  <a:schemeClr val="tx1"/>
+                </a:solidFill>
+                <a:latin typeface="Times New Roman" panose="02020603050405020304" pitchFamily="18" charset="0"/>
+                <a:cs typeface="Times New Roman" panose="02020603050405020304" pitchFamily="18" charset="0"/>
+              </a:rPr>
+              <a:t>    &lt;</a:t>
+            </a:r>
+            <a:r>
+              <a:rPr lang="pt-BR" sz="2400" b="1" dirty="0">
+                <a:solidFill>
+                  <a:schemeClr val="tx1"/>
+                </a:solidFill>
+                <a:latin typeface="Times New Roman" panose="02020603050405020304" pitchFamily="18" charset="0"/>
+                <a:cs typeface="Times New Roman" panose="02020603050405020304" pitchFamily="18" charset="0"/>
+              </a:rPr>
+              <a:t>script</a:t>
+            </a:r>
+            <a:r>
+              <a:rPr lang="pt-BR" sz="2400" dirty="0">
+                <a:solidFill>
+                  <a:schemeClr val="tx1"/>
+                </a:solidFill>
+                <a:latin typeface="Times New Roman" panose="02020603050405020304" pitchFamily="18" charset="0"/>
+                <a:cs typeface="Times New Roman" panose="02020603050405020304" pitchFamily="18" charset="0"/>
+              </a:rPr>
+              <a:t>&gt; </a:t>
+            </a:r>
+            <a:r>
+              <a:rPr lang="pt-BR" sz="2400" b="1" dirty="0">
+                <a:solidFill>
+                  <a:schemeClr val="tx1"/>
+                </a:solidFill>
+                <a:latin typeface="Times New Roman" panose="02020603050405020304" pitchFamily="18" charset="0"/>
+                <a:cs typeface="Times New Roman" panose="02020603050405020304" pitchFamily="18" charset="0"/>
+              </a:rPr>
+              <a:t>instruções JS</a:t>
+            </a:r>
+            <a:r>
+              <a:rPr lang="pt-BR" sz="2400" dirty="0">
+                <a:solidFill>
+                  <a:schemeClr val="tx1"/>
+                </a:solidFill>
+                <a:latin typeface="Times New Roman" panose="02020603050405020304" pitchFamily="18" charset="0"/>
+                <a:cs typeface="Times New Roman" panose="02020603050405020304" pitchFamily="18" charset="0"/>
+              </a:rPr>
+              <a:t> &lt;/script&gt;</a:t>
+            </a:r>
+          </a:p>
+          <a:p>
+            <a:pPr marL="0" indent="0" algn="just">
+              <a:buNone/>
+            </a:pPr>
+            <a:r>
+              <a:rPr lang="pt-BR" sz="2400" dirty="0">
+                <a:solidFill>
+                  <a:schemeClr val="tx1"/>
+                </a:solidFill>
+                <a:latin typeface="Times New Roman" panose="02020603050405020304" pitchFamily="18" charset="0"/>
+                <a:cs typeface="Times New Roman" panose="02020603050405020304" pitchFamily="18" charset="0"/>
+              </a:rPr>
+              <a:t> &lt;/</a:t>
+            </a:r>
+            <a:r>
+              <a:rPr lang="pt-BR" sz="2400" b="1" dirty="0">
+                <a:solidFill>
+                  <a:schemeClr val="tx1"/>
+                </a:solidFill>
+                <a:latin typeface="Times New Roman" panose="02020603050405020304" pitchFamily="18" charset="0"/>
+                <a:cs typeface="Times New Roman" panose="02020603050405020304" pitchFamily="18" charset="0"/>
+              </a:rPr>
+              <a:t>body</a:t>
+            </a:r>
+            <a:r>
+              <a:rPr lang="pt-BR" sz="2400" dirty="0">
+                <a:solidFill>
+                  <a:schemeClr val="tx1"/>
+                </a:solidFill>
+                <a:latin typeface="Times New Roman" panose="02020603050405020304" pitchFamily="18" charset="0"/>
+                <a:cs typeface="Times New Roman" panose="02020603050405020304" pitchFamily="18" charset="0"/>
+              </a:rPr>
+              <a:t>&gt;</a:t>
+            </a:r>
           </a:p>
         </p:txBody>
       </p:sp>
@@ -19487,7 +19395,99 @@
                 <a:latin typeface="Times New Roman" panose="02020603050405020304" pitchFamily="18" charset="0"/>
                 <a:cs typeface="Times New Roman" panose="02020603050405020304" pitchFamily="18" charset="0"/>
               </a:rPr>
-              <a:t> { // input; </a:t>
+              <a:t> { // no HTML acrescentar: </a:t>
+            </a:r>
+            <a:r>
+              <a:rPr lang="pt-BR" sz="2000" b="1" dirty="0" err="1">
+                <a:solidFill>
+                  <a:srgbClr val="FF0000"/>
+                </a:solidFill>
+                <a:latin typeface="Times New Roman" panose="02020603050405020304" pitchFamily="18" charset="0"/>
+                <a:cs typeface="Times New Roman" panose="02020603050405020304" pitchFamily="18" charset="0"/>
+              </a:rPr>
+              <a:t>input:text</a:t>
+            </a:r>
+            <a:r>
+              <a:rPr lang="pt-BR" sz="2000" b="1" dirty="0">
+                <a:solidFill>
+                  <a:srgbClr val="FF0000"/>
+                </a:solidFill>
+                <a:latin typeface="Times New Roman" panose="02020603050405020304" pitchFamily="18" charset="0"/>
+                <a:cs typeface="Times New Roman" panose="02020603050405020304" pitchFamily="18" charset="0"/>
+              </a:rPr>
+              <a:t>; </a:t>
+            </a:r>
+            <a:r>
+              <a:rPr lang="pt-BR" sz="2000" b="1" dirty="0" err="1">
+                <a:solidFill>
+                  <a:srgbClr val="FF0000"/>
+                </a:solidFill>
+                <a:latin typeface="Times New Roman" panose="02020603050405020304" pitchFamily="18" charset="0"/>
+                <a:cs typeface="Times New Roman" panose="02020603050405020304" pitchFamily="18" charset="0"/>
+              </a:rPr>
+              <a:t>input:button</a:t>
+            </a:r>
+            <a:r>
+              <a:rPr lang="pt-BR" sz="2000" b="1" dirty="0">
+                <a:solidFill>
+                  <a:srgbClr val="FF0000"/>
+                </a:solidFill>
+                <a:latin typeface="Times New Roman" panose="02020603050405020304" pitchFamily="18" charset="0"/>
+                <a:cs typeface="Times New Roman" panose="02020603050405020304" pitchFamily="18" charset="0"/>
+              </a:rPr>
+              <a:t>; </a:t>
+            </a:r>
+            <a:r>
+              <a:rPr lang="pt-BR" sz="2000" b="1" dirty="0" err="1">
+                <a:solidFill>
+                  <a:srgbClr val="FF0000"/>
+                </a:solidFill>
+                <a:latin typeface="Times New Roman" panose="02020603050405020304" pitchFamily="18" charset="0"/>
+                <a:cs typeface="Times New Roman" panose="02020603050405020304" pitchFamily="18" charset="0"/>
+              </a:rPr>
+              <a:t>pre</a:t>
+            </a:r>
+            <a:endParaRPr lang="pt-BR" sz="2000" b="1" dirty="0">
+              <a:solidFill>
+                <a:srgbClr val="FF0000"/>
+              </a:solidFill>
+              <a:latin typeface="Times New Roman" panose="02020603050405020304" pitchFamily="18" charset="0"/>
+              <a:cs typeface="Times New Roman" panose="02020603050405020304" pitchFamily="18" charset="0"/>
+            </a:endParaRPr>
+          </a:p>
+          <a:p>
+            <a:pPr marL="0" indent="0" algn="just">
+              <a:buNone/>
+            </a:pPr>
+            <a:r>
+              <a:rPr lang="pt-BR" sz="2000" dirty="0">
+                <a:solidFill>
+                  <a:schemeClr val="tx1"/>
+                </a:solidFill>
+                <a:latin typeface="Times New Roman" panose="02020603050405020304" pitchFamily="18" charset="0"/>
+                <a:cs typeface="Times New Roman" panose="02020603050405020304" pitchFamily="18" charset="0"/>
+              </a:rPr>
+              <a:t>	</a:t>
+            </a:r>
+            <a:r>
+              <a:rPr lang="pt-BR" sz="2000" b="1" dirty="0" err="1">
+                <a:solidFill>
+                  <a:schemeClr val="tx1"/>
+                </a:solidFill>
+                <a:latin typeface="Times New Roman" panose="02020603050405020304" pitchFamily="18" charset="0"/>
+                <a:cs typeface="Times New Roman" panose="02020603050405020304" pitchFamily="18" charset="0"/>
+              </a:rPr>
+              <a:t>let</a:t>
+            </a:r>
+            <a:r>
+              <a:rPr lang="pt-BR" sz="2000" dirty="0">
+                <a:solidFill>
+                  <a:schemeClr val="tx1"/>
+                </a:solidFill>
+                <a:latin typeface="Times New Roman" panose="02020603050405020304" pitchFamily="18" charset="0"/>
+                <a:cs typeface="Times New Roman" panose="02020603050405020304" pitchFamily="18" charset="0"/>
+              </a:rPr>
+              <a:t> </a:t>
             </a:r>
             <a:r>
               <a:rPr lang="pt-BR" sz="2000" dirty="0" err="1">
@@ -19497,7 +19497,7 @@
                 <a:latin typeface="Times New Roman" panose="02020603050405020304" pitchFamily="18" charset="0"/>
                 <a:cs typeface="Times New Roman" panose="02020603050405020304" pitchFamily="18" charset="0"/>
               </a:rPr>
-              <a:t>button</a:t>
+              <a:t>inputCEP</a:t>
             </a:r>
             <a:r>
               <a:rPr lang="pt-BR" sz="2000" dirty="0">
@@ -19507,13 +19507,28 @@
                 <a:latin typeface="Times New Roman" panose="02020603050405020304" pitchFamily="18" charset="0"/>
                 <a:cs typeface="Times New Roman" panose="02020603050405020304" pitchFamily="18" charset="0"/>
               </a:rPr>
-              <a:t>; p</a:t>
-            </a:r>
-          </a:p>
-          <a:p>
-            <a:pPr marL="0" indent="0" algn="just">
-              <a:buNone/>
-            </a:pPr>
+              <a:t> = </a:t>
+            </a:r>
+            <a:r>
+              <a:rPr lang="pt-BR" sz="2000" dirty="0" err="1">
+                <a:solidFill>
+                  <a:schemeClr val="tx1"/>
+                </a:solidFill>
+                <a:latin typeface="Times New Roman" panose="02020603050405020304" pitchFamily="18" charset="0"/>
+                <a:cs typeface="Times New Roman" panose="02020603050405020304" pitchFamily="18" charset="0"/>
+              </a:rPr>
+              <a:t>document.</a:t>
+            </a:r>
+            <a:r>
+              <a:rPr lang="pt-BR" sz="2000" b="1" dirty="0" err="1">
+                <a:solidFill>
+                  <a:srgbClr val="FF0000"/>
+                </a:solidFill>
+                <a:latin typeface="Times New Roman" panose="02020603050405020304" pitchFamily="18" charset="0"/>
+                <a:cs typeface="Times New Roman" panose="02020603050405020304" pitchFamily="18" charset="0"/>
+              </a:rPr>
+              <a:t>getElementById</a:t>
+            </a:r>
             <a:r>
               <a:rPr lang="pt-BR" sz="2000" dirty="0">
                 <a:solidFill>
@@ -19522,7 +19537,7 @@
                 <a:latin typeface="Times New Roman" panose="02020603050405020304" pitchFamily="18" charset="0"/>
                 <a:cs typeface="Times New Roman" panose="02020603050405020304" pitchFamily="18" charset="0"/>
               </a:rPr>
-              <a:t>	</a:t>
+              <a:t>("</a:t>
             </a:r>
             <a:r>
               <a:rPr lang="pt-BR" sz="2000" b="1" dirty="0" err="1">
@@ -19532,6 +19547,331 @@
                 <a:latin typeface="Times New Roman" panose="02020603050405020304" pitchFamily="18" charset="0"/>
                 <a:cs typeface="Times New Roman" panose="02020603050405020304" pitchFamily="18" charset="0"/>
               </a:rPr>
+              <a:t>idCEP</a:t>
+            </a:r>
+            <a:r>
+              <a:rPr lang="pt-BR" sz="2000" dirty="0">
+                <a:solidFill>
+                  <a:schemeClr val="tx1"/>
+                </a:solidFill>
+                <a:latin typeface="Times New Roman" panose="02020603050405020304" pitchFamily="18" charset="0"/>
+                <a:cs typeface="Times New Roman" panose="02020603050405020304" pitchFamily="18" charset="0"/>
+              </a:rPr>
+              <a:t>").</a:t>
+            </a:r>
+            <a:r>
+              <a:rPr lang="pt-BR" sz="2000" dirty="0" err="1">
+                <a:solidFill>
+                  <a:schemeClr val="tx1"/>
+                </a:solidFill>
+                <a:latin typeface="Times New Roman" panose="02020603050405020304" pitchFamily="18" charset="0"/>
+                <a:cs typeface="Times New Roman" panose="02020603050405020304" pitchFamily="18" charset="0"/>
+              </a:rPr>
+              <a:t>value</a:t>
+            </a:r>
+            <a:r>
+              <a:rPr lang="pt-BR" sz="2000" dirty="0">
+                <a:solidFill>
+                  <a:schemeClr val="tx1"/>
+                </a:solidFill>
+                <a:latin typeface="Times New Roman" panose="02020603050405020304" pitchFamily="18" charset="0"/>
+                <a:cs typeface="Times New Roman" panose="02020603050405020304" pitchFamily="18" charset="0"/>
+              </a:rPr>
+              <a:t>;</a:t>
+            </a:r>
+          </a:p>
+          <a:p>
+            <a:pPr marL="447675" lvl="1" indent="0" algn="just">
+              <a:buNone/>
+            </a:pPr>
+            <a:r>
+              <a:rPr lang="pt-BR" sz="2000" b="1" dirty="0" err="1">
+                <a:solidFill>
+                  <a:schemeClr val="tx1"/>
+                </a:solidFill>
+                <a:latin typeface="Times New Roman" panose="02020603050405020304" pitchFamily="18" charset="0"/>
+                <a:cs typeface="Times New Roman" panose="02020603050405020304" pitchFamily="18" charset="0"/>
+              </a:rPr>
+              <a:t>const</a:t>
+            </a:r>
+            <a:r>
+              <a:rPr lang="pt-BR" sz="2000" dirty="0">
+                <a:solidFill>
+                  <a:schemeClr val="tx1"/>
+                </a:solidFill>
+                <a:latin typeface="Times New Roman" panose="02020603050405020304" pitchFamily="18" charset="0"/>
+                <a:cs typeface="Times New Roman" panose="02020603050405020304" pitchFamily="18" charset="0"/>
+              </a:rPr>
+              <a:t> </a:t>
+            </a:r>
+            <a:r>
+              <a:rPr lang="pt-BR" sz="2000" dirty="0" err="1">
+                <a:solidFill>
+                  <a:schemeClr val="tx1"/>
+                </a:solidFill>
+                <a:latin typeface="Times New Roman" panose="02020603050405020304" pitchFamily="18" charset="0"/>
+                <a:cs typeface="Times New Roman" panose="02020603050405020304" pitchFamily="18" charset="0"/>
+              </a:rPr>
+              <a:t>ajax</a:t>
+            </a:r>
+            <a:r>
+              <a:rPr lang="pt-BR" sz="2000" dirty="0">
+                <a:solidFill>
+                  <a:schemeClr val="tx1"/>
+                </a:solidFill>
+                <a:latin typeface="Times New Roman" panose="02020603050405020304" pitchFamily="18" charset="0"/>
+                <a:cs typeface="Times New Roman" panose="02020603050405020304" pitchFamily="18" charset="0"/>
+              </a:rPr>
+              <a:t> = </a:t>
+            </a:r>
+            <a:r>
+              <a:rPr lang="pt-BR" sz="2000" b="1" dirty="0">
+                <a:solidFill>
+                  <a:schemeClr val="tx1"/>
+                </a:solidFill>
+                <a:latin typeface="Times New Roman" panose="02020603050405020304" pitchFamily="18" charset="0"/>
+                <a:cs typeface="Times New Roman" panose="02020603050405020304" pitchFamily="18" charset="0"/>
+              </a:rPr>
+              <a:t>new</a:t>
+            </a:r>
+            <a:r>
+              <a:rPr lang="pt-BR" sz="2000" dirty="0">
+                <a:solidFill>
+                  <a:schemeClr val="tx1"/>
+                </a:solidFill>
+                <a:latin typeface="Times New Roman" panose="02020603050405020304" pitchFamily="18" charset="0"/>
+                <a:cs typeface="Times New Roman" panose="02020603050405020304" pitchFamily="18" charset="0"/>
+              </a:rPr>
+              <a:t> </a:t>
+            </a:r>
+            <a:r>
+              <a:rPr lang="pt-BR" sz="2000" b="1" dirty="0" err="1">
+                <a:solidFill>
+                  <a:srgbClr val="FF0000"/>
+                </a:solidFill>
+                <a:latin typeface="Times New Roman" panose="02020603050405020304" pitchFamily="18" charset="0"/>
+                <a:cs typeface="Times New Roman" panose="02020603050405020304" pitchFamily="18" charset="0"/>
+              </a:rPr>
+              <a:t>XMLHttpRequest</a:t>
+            </a:r>
+            <a:r>
+              <a:rPr lang="pt-BR" sz="2000" dirty="0">
+                <a:solidFill>
+                  <a:schemeClr val="tx1"/>
+                </a:solidFill>
+                <a:latin typeface="Times New Roman" panose="02020603050405020304" pitchFamily="18" charset="0"/>
+                <a:cs typeface="Times New Roman" panose="02020603050405020304" pitchFamily="18" charset="0"/>
+              </a:rPr>
+              <a:t>();</a:t>
+            </a:r>
+          </a:p>
+          <a:p>
+            <a:pPr marL="447675" lvl="1" indent="0" algn="just">
+              <a:buNone/>
+            </a:pPr>
+            <a:r>
+              <a:rPr lang="pt-BR" sz="2000" dirty="0" err="1">
+                <a:solidFill>
+                  <a:schemeClr val="tx1"/>
+                </a:solidFill>
+                <a:latin typeface="Times New Roman" panose="02020603050405020304" pitchFamily="18" charset="0"/>
+                <a:cs typeface="Times New Roman" panose="02020603050405020304" pitchFamily="18" charset="0"/>
+              </a:rPr>
+              <a:t>ajax.</a:t>
+            </a:r>
+            <a:r>
+              <a:rPr lang="pt-BR" sz="2000" b="1" dirty="0" err="1">
+                <a:solidFill>
+                  <a:srgbClr val="FF0000"/>
+                </a:solidFill>
+                <a:latin typeface="Times New Roman" panose="02020603050405020304" pitchFamily="18" charset="0"/>
+                <a:cs typeface="Times New Roman" panose="02020603050405020304" pitchFamily="18" charset="0"/>
+              </a:rPr>
+              <a:t>open</a:t>
+            </a:r>
+            <a:r>
+              <a:rPr lang="pt-BR" sz="2000" dirty="0">
+                <a:solidFill>
+                  <a:schemeClr val="tx1"/>
+                </a:solidFill>
+                <a:latin typeface="Times New Roman" panose="02020603050405020304" pitchFamily="18" charset="0"/>
+                <a:cs typeface="Times New Roman" panose="02020603050405020304" pitchFamily="18" charset="0"/>
+              </a:rPr>
+              <a:t>("GET", "</a:t>
+            </a:r>
+            <a:r>
+              <a:rPr lang="pt-BR" sz="2000" b="1" dirty="0">
+                <a:solidFill>
+                  <a:schemeClr val="tx1"/>
+                </a:solidFill>
+                <a:latin typeface="Times New Roman" panose="02020603050405020304" pitchFamily="18" charset="0"/>
+                <a:cs typeface="Times New Roman" panose="02020603050405020304" pitchFamily="18" charset="0"/>
+              </a:rPr>
+              <a:t>https://viacep.com.br/ws/" + </a:t>
+            </a:r>
+            <a:r>
+              <a:rPr lang="pt-BR" sz="2000" b="1" dirty="0" err="1">
+                <a:solidFill>
+                  <a:schemeClr val="tx1"/>
+                </a:solidFill>
+                <a:latin typeface="Times New Roman" panose="02020603050405020304" pitchFamily="18" charset="0"/>
+                <a:cs typeface="Times New Roman" panose="02020603050405020304" pitchFamily="18" charset="0"/>
+              </a:rPr>
+              <a:t>inputCEP</a:t>
+            </a:r>
+            <a:r>
+              <a:rPr lang="pt-BR" sz="2000" b="1" dirty="0">
+                <a:solidFill>
+                  <a:schemeClr val="tx1"/>
+                </a:solidFill>
+                <a:latin typeface="Times New Roman" panose="02020603050405020304" pitchFamily="18" charset="0"/>
+                <a:cs typeface="Times New Roman" panose="02020603050405020304" pitchFamily="18" charset="0"/>
+              </a:rPr>
+              <a:t> + "/</a:t>
+            </a:r>
+            <a:r>
+              <a:rPr lang="pt-BR" sz="2000" b="1" dirty="0" err="1">
+                <a:solidFill>
+                  <a:schemeClr val="tx1"/>
+                </a:solidFill>
+                <a:latin typeface="Times New Roman" panose="02020603050405020304" pitchFamily="18" charset="0"/>
+                <a:cs typeface="Times New Roman" panose="02020603050405020304" pitchFamily="18" charset="0"/>
+              </a:rPr>
+              <a:t>json</a:t>
+            </a:r>
+            <a:r>
+              <a:rPr lang="pt-BR" sz="2000" b="1" dirty="0">
+                <a:solidFill>
+                  <a:schemeClr val="tx1"/>
+                </a:solidFill>
+                <a:latin typeface="Times New Roman" panose="02020603050405020304" pitchFamily="18" charset="0"/>
+                <a:cs typeface="Times New Roman" panose="02020603050405020304" pitchFamily="18" charset="0"/>
+              </a:rPr>
+              <a:t>/"</a:t>
+            </a:r>
+            <a:r>
+              <a:rPr lang="pt-BR" sz="2000" dirty="0">
+                <a:solidFill>
+                  <a:schemeClr val="tx1"/>
+                </a:solidFill>
+                <a:latin typeface="Times New Roman" panose="02020603050405020304" pitchFamily="18" charset="0"/>
+                <a:cs typeface="Times New Roman" panose="02020603050405020304" pitchFamily="18" charset="0"/>
+              </a:rPr>
+              <a:t>);</a:t>
+            </a:r>
+          </a:p>
+          <a:p>
+            <a:pPr marL="447675" lvl="1" indent="0" algn="just">
+              <a:buNone/>
+            </a:pPr>
+            <a:r>
+              <a:rPr lang="pt-BR" sz="2000" dirty="0" err="1">
+                <a:solidFill>
+                  <a:schemeClr val="tx1"/>
+                </a:solidFill>
+                <a:latin typeface="Times New Roman" panose="02020603050405020304" pitchFamily="18" charset="0"/>
+                <a:cs typeface="Times New Roman" panose="02020603050405020304" pitchFamily="18" charset="0"/>
+              </a:rPr>
+              <a:t>ajax.</a:t>
+            </a:r>
+            <a:r>
+              <a:rPr lang="pt-BR" sz="2000" b="1" dirty="0" err="1">
+                <a:solidFill>
+                  <a:srgbClr val="FF0000"/>
+                </a:solidFill>
+                <a:latin typeface="Times New Roman" panose="02020603050405020304" pitchFamily="18" charset="0"/>
+                <a:cs typeface="Times New Roman" panose="02020603050405020304" pitchFamily="18" charset="0"/>
+              </a:rPr>
+              <a:t>send</a:t>
+            </a:r>
+            <a:r>
+              <a:rPr lang="pt-BR" sz="2000" dirty="0">
+                <a:solidFill>
+                  <a:schemeClr val="tx1"/>
+                </a:solidFill>
+                <a:latin typeface="Times New Roman" panose="02020603050405020304" pitchFamily="18" charset="0"/>
+                <a:cs typeface="Times New Roman" panose="02020603050405020304" pitchFamily="18" charset="0"/>
+              </a:rPr>
+              <a:t>(); </a:t>
+            </a:r>
+          </a:p>
+          <a:p>
+            <a:pPr marL="447675" lvl="1" indent="0" algn="just">
+              <a:buNone/>
+            </a:pPr>
+            <a:r>
+              <a:rPr lang="pt-BR" sz="2000" dirty="0" err="1">
+                <a:solidFill>
+                  <a:schemeClr val="tx1"/>
+                </a:solidFill>
+                <a:latin typeface="Times New Roman" panose="02020603050405020304" pitchFamily="18" charset="0"/>
+                <a:cs typeface="Times New Roman" panose="02020603050405020304" pitchFamily="18" charset="0"/>
+              </a:rPr>
+              <a:t>ajax.</a:t>
+            </a:r>
+            <a:r>
+              <a:rPr lang="pt-BR" sz="2000" b="1" dirty="0" err="1">
+                <a:solidFill>
+                  <a:srgbClr val="FF0000"/>
+                </a:solidFill>
+                <a:latin typeface="Times New Roman" panose="02020603050405020304" pitchFamily="18" charset="0"/>
+                <a:cs typeface="Times New Roman" panose="02020603050405020304" pitchFamily="18" charset="0"/>
+              </a:rPr>
+              <a:t>onload</a:t>
+            </a:r>
+            <a:r>
+              <a:rPr lang="pt-BR" sz="2000" dirty="0">
+                <a:solidFill>
+                  <a:schemeClr val="tx1"/>
+                </a:solidFill>
+                <a:latin typeface="Times New Roman" panose="02020603050405020304" pitchFamily="18" charset="0"/>
+                <a:cs typeface="Times New Roman" panose="02020603050405020304" pitchFamily="18" charset="0"/>
+              </a:rPr>
+              <a:t> = </a:t>
+            </a:r>
+            <a:r>
+              <a:rPr lang="pt-BR" sz="2000" b="1" dirty="0" err="1">
+                <a:solidFill>
+                  <a:schemeClr val="tx1"/>
+                </a:solidFill>
+                <a:latin typeface="Times New Roman" panose="02020603050405020304" pitchFamily="18" charset="0"/>
+                <a:cs typeface="Times New Roman" panose="02020603050405020304" pitchFamily="18" charset="0"/>
+              </a:rPr>
+              <a:t>function</a:t>
+            </a:r>
+            <a:r>
+              <a:rPr lang="pt-BR" sz="2000" dirty="0">
+                <a:solidFill>
+                  <a:schemeClr val="tx1"/>
+                </a:solidFill>
+                <a:latin typeface="Times New Roman" panose="02020603050405020304" pitchFamily="18" charset="0"/>
+                <a:cs typeface="Times New Roman" panose="02020603050405020304" pitchFamily="18" charset="0"/>
+              </a:rPr>
+              <a:t>(){  </a:t>
+            </a:r>
+          </a:p>
+          <a:p>
+            <a:pPr marL="447675" lvl="1" indent="0" algn="just">
+              <a:buNone/>
+            </a:pPr>
+            <a:r>
+              <a:rPr lang="pt-BR" sz="2000" b="1" dirty="0">
+                <a:solidFill>
+                  <a:schemeClr val="tx1"/>
+                </a:solidFill>
+                <a:latin typeface="Times New Roman" panose="02020603050405020304" pitchFamily="18" charset="0"/>
+                <a:cs typeface="Times New Roman" panose="02020603050405020304" pitchFamily="18" charset="0"/>
+              </a:rPr>
+              <a:t>	    </a:t>
+            </a:r>
+            <a:r>
+              <a:rPr lang="pt-BR" sz="2000" b="1" dirty="0" err="1">
+                <a:solidFill>
+                  <a:schemeClr val="tx1"/>
+                </a:solidFill>
+                <a:latin typeface="Times New Roman" panose="02020603050405020304" pitchFamily="18" charset="0"/>
+                <a:cs typeface="Times New Roman" panose="02020603050405020304" pitchFamily="18" charset="0"/>
+              </a:rPr>
               <a:t>let</a:t>
             </a:r>
             <a:r>
@@ -19545,6 +19885,36 @@
               <a:t> </a:t>
             </a:r>
             <a:r>
+              <a:rPr lang="pt-BR" sz="2000" b="1" dirty="0" err="1">
+                <a:solidFill>
+                  <a:srgbClr val="FF0000"/>
+                </a:solidFill>
+                <a:latin typeface="Times New Roman" panose="02020603050405020304" pitchFamily="18" charset="0"/>
+                <a:cs typeface="Times New Roman" panose="02020603050405020304" pitchFamily="18" charset="0"/>
+              </a:rPr>
+              <a:t>objCEP</a:t>
+            </a:r>
+            <a:r>
+              <a:rPr lang="pt-BR" sz="2000" dirty="0">
+                <a:solidFill>
+                  <a:schemeClr val="tx1"/>
+                </a:solidFill>
+                <a:latin typeface="Times New Roman" panose="02020603050405020304" pitchFamily="18" charset="0"/>
+                <a:cs typeface="Times New Roman" panose="02020603050405020304" pitchFamily="18" charset="0"/>
+              </a:rPr>
+              <a:t> = </a:t>
+            </a:r>
+            <a:r>
+              <a:rPr lang="pt-BR" sz="2000" b="1" dirty="0" err="1">
+                <a:solidFill>
+                  <a:schemeClr val="tx1"/>
+                </a:solidFill>
+                <a:latin typeface="Times New Roman" panose="02020603050405020304" pitchFamily="18" charset="0"/>
+                <a:cs typeface="Times New Roman" panose="02020603050405020304" pitchFamily="18" charset="0"/>
+              </a:rPr>
+              <a:t>JSON</a:t>
+            </a:r>
+            <a:r>
               <a:rPr lang="pt-BR" sz="2000" dirty="0" err="1">
                 <a:solidFill>
                   <a:schemeClr val="tx1"/>
@@ -19552,7 +19922,7 @@
                 <a:latin typeface="Times New Roman" panose="02020603050405020304" pitchFamily="18" charset="0"/>
                 <a:cs typeface="Times New Roman" panose="02020603050405020304" pitchFamily="18" charset="0"/>
               </a:rPr>
-              <a:t>inputCEP</a:t>
+              <a:t>.parse</a:t>
             </a:r>
             <a:r>
               <a:rPr lang="pt-BR" sz="2000" dirty="0">
@@ -19562,6 +19932,91 @@
                 <a:latin typeface="Times New Roman" panose="02020603050405020304" pitchFamily="18" charset="0"/>
                 <a:cs typeface="Times New Roman" panose="02020603050405020304" pitchFamily="18" charset="0"/>
               </a:rPr>
+              <a:t>(</a:t>
+            </a:r>
+            <a:r>
+              <a:rPr lang="pt-BR" sz="2000" b="1" dirty="0" err="1">
+                <a:solidFill>
+                  <a:schemeClr val="tx1"/>
+                </a:solidFill>
+                <a:latin typeface="Times New Roman" panose="02020603050405020304" pitchFamily="18" charset="0"/>
+                <a:cs typeface="Times New Roman" panose="02020603050405020304" pitchFamily="18" charset="0"/>
+              </a:rPr>
+              <a:t>this</a:t>
+            </a:r>
+            <a:r>
+              <a:rPr lang="pt-BR" sz="2000" dirty="0" err="1">
+                <a:solidFill>
+                  <a:schemeClr val="tx1"/>
+                </a:solidFill>
+                <a:latin typeface="Times New Roman" panose="02020603050405020304" pitchFamily="18" charset="0"/>
+                <a:cs typeface="Times New Roman" panose="02020603050405020304" pitchFamily="18" charset="0"/>
+              </a:rPr>
+              <a:t>.responseText</a:t>
+            </a:r>
+            <a:r>
+              <a:rPr lang="pt-BR" sz="2000" dirty="0">
+                <a:solidFill>
+                  <a:schemeClr val="tx1"/>
+                </a:solidFill>
+                <a:latin typeface="Times New Roman" panose="02020603050405020304" pitchFamily="18" charset="0"/>
+                <a:cs typeface="Times New Roman" panose="02020603050405020304" pitchFamily="18" charset="0"/>
+              </a:rPr>
+              <a:t>);</a:t>
+            </a:r>
+          </a:p>
+          <a:p>
+            <a:pPr marL="447675" lvl="1" indent="0" algn="just">
+              <a:buNone/>
+            </a:pPr>
+            <a:r>
+              <a:rPr lang="pt-BR" sz="2000" dirty="0">
+                <a:solidFill>
+                  <a:schemeClr val="tx1"/>
+                </a:solidFill>
+                <a:latin typeface="Times New Roman" panose="02020603050405020304" pitchFamily="18" charset="0"/>
+                <a:cs typeface="Times New Roman" panose="02020603050405020304" pitchFamily="18" charset="0"/>
+              </a:rPr>
+              <a:t>	    </a:t>
+            </a:r>
+            <a:r>
+              <a:rPr lang="pt-BR" sz="2000" b="1" dirty="0" err="1">
+                <a:solidFill>
+                  <a:schemeClr val="tx1"/>
+                </a:solidFill>
+                <a:latin typeface="Times New Roman" panose="02020603050405020304" pitchFamily="18" charset="0"/>
+                <a:cs typeface="Times New Roman" panose="02020603050405020304" pitchFamily="18" charset="0"/>
+              </a:rPr>
+              <a:t>let</a:t>
+            </a:r>
+            <a:r>
+              <a:rPr lang="pt-BR" sz="2000" dirty="0">
+                <a:solidFill>
+                  <a:schemeClr val="tx1"/>
+                </a:solidFill>
+                <a:latin typeface="Times New Roman" panose="02020603050405020304" pitchFamily="18" charset="0"/>
+                <a:cs typeface="Times New Roman" panose="02020603050405020304" pitchFamily="18" charset="0"/>
+              </a:rPr>
+              <a:t> </a:t>
+            </a:r>
+            <a:r>
+              <a:rPr lang="pt-BR" sz="2000" dirty="0" err="1">
+                <a:solidFill>
+                  <a:schemeClr val="tx1"/>
+                </a:solidFill>
+                <a:latin typeface="Times New Roman" panose="02020603050405020304" pitchFamily="18" charset="0"/>
+                <a:cs typeface="Times New Roman" panose="02020603050405020304" pitchFamily="18" charset="0"/>
+              </a:rPr>
+              <a:t>lograd</a:t>
+            </a:r>
+            <a:r>
+              <a:rPr lang="pt-BR" sz="2000" dirty="0">
+                <a:solidFill>
+                  <a:schemeClr val="tx1"/>
+                </a:solidFill>
+                <a:latin typeface="Times New Roman" panose="02020603050405020304" pitchFamily="18" charset="0"/>
+                <a:cs typeface="Times New Roman" panose="02020603050405020304" pitchFamily="18" charset="0"/>
+              </a:rPr>
               <a:t> = </a:t>
             </a:r>
             <a:r>
@@ -19572,11 +20027,151 @@
                 <a:latin typeface="Times New Roman" panose="02020603050405020304" pitchFamily="18" charset="0"/>
                 <a:cs typeface="Times New Roman" panose="02020603050405020304" pitchFamily="18" charset="0"/>
               </a:rPr>
-              <a:t>document.</a:t>
+              <a:t>objCEP.logradouro</a:t>
+            </a:r>
+            <a:r>
+              <a:rPr lang="pt-BR" sz="2000" dirty="0">
+                <a:solidFill>
+                  <a:schemeClr val="tx1"/>
+                </a:solidFill>
+                <a:latin typeface="Times New Roman" panose="02020603050405020304" pitchFamily="18" charset="0"/>
+                <a:cs typeface="Times New Roman" panose="02020603050405020304" pitchFamily="18" charset="0"/>
+              </a:rPr>
+              <a:t>; </a:t>
             </a:r>
             <a:r>
               <a:rPr lang="pt-BR" sz="2000" b="1" dirty="0" err="1">
                 <a:solidFill>
+                  <a:schemeClr val="tx1"/>
+                </a:solidFill>
+                <a:latin typeface="Times New Roman" panose="02020603050405020304" pitchFamily="18" charset="0"/>
+                <a:cs typeface="Times New Roman" panose="02020603050405020304" pitchFamily="18" charset="0"/>
+              </a:rPr>
+              <a:t>let</a:t>
+            </a:r>
+            <a:r>
+              <a:rPr lang="pt-BR" sz="2000" dirty="0">
+                <a:solidFill>
+                  <a:schemeClr val="tx1"/>
+                </a:solidFill>
+                <a:latin typeface="Times New Roman" panose="02020603050405020304" pitchFamily="18" charset="0"/>
+                <a:cs typeface="Times New Roman" panose="02020603050405020304" pitchFamily="18" charset="0"/>
+              </a:rPr>
+              <a:t> cidade = </a:t>
+            </a:r>
+            <a:r>
+              <a:rPr lang="pt-BR" sz="2000" dirty="0" err="1">
+                <a:solidFill>
+                  <a:schemeClr val="tx1"/>
+                </a:solidFill>
+                <a:latin typeface="Times New Roman" panose="02020603050405020304" pitchFamily="18" charset="0"/>
+                <a:cs typeface="Times New Roman" panose="02020603050405020304" pitchFamily="18" charset="0"/>
+              </a:rPr>
+              <a:t>objCEP.bairro</a:t>
+            </a:r>
+            <a:r>
+              <a:rPr lang="pt-BR" sz="2000" dirty="0">
+                <a:solidFill>
+                  <a:schemeClr val="tx1"/>
+                </a:solidFill>
+                <a:latin typeface="Times New Roman" panose="02020603050405020304" pitchFamily="18" charset="0"/>
+                <a:cs typeface="Times New Roman" panose="02020603050405020304" pitchFamily="18" charset="0"/>
+              </a:rPr>
+              <a:t>; </a:t>
+            </a:r>
+          </a:p>
+          <a:p>
+            <a:pPr marL="447675" lvl="1" indent="0" algn="just">
+              <a:buNone/>
+            </a:pPr>
+            <a:r>
+              <a:rPr lang="pt-BR" sz="2000" dirty="0">
+                <a:solidFill>
+                  <a:schemeClr val="tx1"/>
+                </a:solidFill>
+                <a:latin typeface="Times New Roman" panose="02020603050405020304" pitchFamily="18" charset="0"/>
+                <a:cs typeface="Times New Roman" panose="02020603050405020304" pitchFamily="18" charset="0"/>
+              </a:rPr>
+              <a:t>	    </a:t>
+            </a:r>
+            <a:r>
+              <a:rPr lang="pt-BR" sz="2000" b="1" dirty="0" err="1">
+                <a:solidFill>
+                  <a:schemeClr val="tx1"/>
+                </a:solidFill>
+                <a:latin typeface="Times New Roman" panose="02020603050405020304" pitchFamily="18" charset="0"/>
+                <a:cs typeface="Times New Roman" panose="02020603050405020304" pitchFamily="18" charset="0"/>
+              </a:rPr>
+              <a:t>let</a:t>
+            </a:r>
+            <a:r>
+              <a:rPr lang="pt-BR" sz="2000" dirty="0">
+                <a:solidFill>
+                  <a:schemeClr val="tx1"/>
+                </a:solidFill>
+                <a:latin typeface="Times New Roman" panose="02020603050405020304" pitchFamily="18" charset="0"/>
+                <a:cs typeface="Times New Roman" panose="02020603050405020304" pitchFamily="18" charset="0"/>
+              </a:rPr>
+              <a:t> uf = </a:t>
+            </a:r>
+            <a:r>
+              <a:rPr lang="pt-BR" sz="2000" dirty="0" err="1">
+                <a:solidFill>
+                  <a:schemeClr val="tx1"/>
+                </a:solidFill>
+                <a:latin typeface="Times New Roman" panose="02020603050405020304" pitchFamily="18" charset="0"/>
+                <a:cs typeface="Times New Roman" panose="02020603050405020304" pitchFamily="18" charset="0"/>
+              </a:rPr>
+              <a:t>objCEP.uf</a:t>
+            </a:r>
+            <a:r>
+              <a:rPr lang="pt-BR" sz="2000" dirty="0">
+                <a:solidFill>
+                  <a:schemeClr val="tx1"/>
+                </a:solidFill>
+                <a:latin typeface="Times New Roman" panose="02020603050405020304" pitchFamily="18" charset="0"/>
+                <a:cs typeface="Times New Roman" panose="02020603050405020304" pitchFamily="18" charset="0"/>
+              </a:rPr>
+              <a:t>;</a:t>
+            </a:r>
+          </a:p>
+          <a:p>
+            <a:pPr marL="447675" lvl="1" indent="0" algn="just">
+              <a:buNone/>
+            </a:pPr>
+            <a:r>
+              <a:rPr lang="pt-BR" sz="2000" dirty="0">
+                <a:solidFill>
+                  <a:schemeClr val="tx1"/>
+                </a:solidFill>
+                <a:latin typeface="Times New Roman" panose="02020603050405020304" pitchFamily="18" charset="0"/>
+                <a:cs typeface="Times New Roman" panose="02020603050405020304" pitchFamily="18" charset="0"/>
+              </a:rPr>
+              <a:t>	    </a:t>
+            </a:r>
+            <a:r>
+              <a:rPr lang="pt-BR" sz="2000" b="1" dirty="0" err="1">
+                <a:solidFill>
+                  <a:schemeClr val="tx1"/>
+                </a:solidFill>
+                <a:latin typeface="Times New Roman" panose="02020603050405020304" pitchFamily="18" charset="0"/>
+                <a:cs typeface="Times New Roman" panose="02020603050405020304" pitchFamily="18" charset="0"/>
+              </a:rPr>
+              <a:t>document</a:t>
+            </a:r>
+            <a:r>
+              <a:rPr lang="pt-BR" sz="2000" dirty="0" err="1">
+                <a:solidFill>
+                  <a:schemeClr val="tx1"/>
+                </a:solidFill>
+                <a:latin typeface="Times New Roman" panose="02020603050405020304" pitchFamily="18" charset="0"/>
+                <a:cs typeface="Times New Roman" panose="02020603050405020304" pitchFamily="18" charset="0"/>
+              </a:rPr>
+              <a:t>.</a:t>
+            </a:r>
+            <a:r>
+              <a:rPr lang="pt-BR" sz="2000" b="1" dirty="0" err="1">
+                <a:solidFill>
                   <a:srgbClr val="FF0000"/>
                 </a:solidFill>
                 <a:latin typeface="Times New Roman" panose="02020603050405020304" pitchFamily="18" charset="0"/>
@@ -19595,6 +20190,26 @@
               <a:t>(“</a:t>
             </a:r>
             <a:r>
+              <a:rPr lang="pt-BR" sz="2000" b="1" dirty="0" err="1">
+                <a:solidFill>
+                  <a:srgbClr val="FF0000"/>
+                </a:solidFill>
+                <a:latin typeface="Times New Roman" panose="02020603050405020304" pitchFamily="18" charset="0"/>
+                <a:cs typeface="Times New Roman" panose="02020603050405020304" pitchFamily="18" charset="0"/>
+              </a:rPr>
+              <a:t>idArea</a:t>
+            </a:r>
+            <a:r>
+              <a:rPr lang="pt-BR" sz="2000" dirty="0">
+                <a:solidFill>
+                  <a:schemeClr val="tx1"/>
+                </a:solidFill>
+                <a:latin typeface="Times New Roman" panose="02020603050405020304" pitchFamily="18" charset="0"/>
+                <a:cs typeface="Times New Roman" panose="02020603050405020304" pitchFamily="18" charset="0"/>
+              </a:rPr>
+              <a:t>”).</a:t>
+            </a:r>
+            <a:r>
               <a:rPr lang="pt-BR" sz="2000" dirty="0" err="1">
                 <a:solidFill>
                   <a:schemeClr val="tx1"/>
@@ -19602,7 +20217,7 @@
                 <a:latin typeface="Times New Roman" panose="02020603050405020304" pitchFamily="18" charset="0"/>
                 <a:cs typeface="Times New Roman" panose="02020603050405020304" pitchFamily="18" charset="0"/>
               </a:rPr>
-              <a:t>IdCEP</a:t>
+              <a:t>innerHTML</a:t>
             </a:r>
             <a:r>
               <a:rPr lang="pt-BR" sz="2000" dirty="0">
@@ -19612,7 +20227,7 @@
                 <a:latin typeface="Times New Roman" panose="02020603050405020304" pitchFamily="18" charset="0"/>
                 <a:cs typeface="Times New Roman" panose="02020603050405020304" pitchFamily="18" charset="0"/>
               </a:rPr>
-              <a:t>”).</a:t>
+              <a:t> = </a:t>
             </a:r>
             <a:r>
               <a:rPr lang="pt-BR" sz="2000" dirty="0" err="1">
@@ -19622,7 +20237,7 @@
                 <a:latin typeface="Times New Roman" panose="02020603050405020304" pitchFamily="18" charset="0"/>
                 <a:cs typeface="Times New Roman" panose="02020603050405020304" pitchFamily="18" charset="0"/>
               </a:rPr>
-              <a:t>value</a:t>
+              <a:t>lograd</a:t>
             </a:r>
             <a:r>
               <a:rPr lang="pt-BR" sz="2000" dirty="0">
@@ -19632,677 +20247,7 @@
                 <a:latin typeface="Times New Roman" panose="02020603050405020304" pitchFamily="18" charset="0"/>
                 <a:cs typeface="Times New Roman" panose="02020603050405020304" pitchFamily="18" charset="0"/>
               </a:rPr>
-              <a:t>;</a:t>
-            </a:r>
-          </a:p>
-          <a:p>
-            <a:pPr marL="447675" lvl="1" indent="0" algn="just">
-              <a:buNone/>
-            </a:pPr>
-            <a:r>
-              <a:rPr lang="pt-BR" sz="2000" b="1" dirty="0" err="1">
-                <a:solidFill>
-                  <a:schemeClr val="tx1"/>
-                </a:solidFill>
-                <a:latin typeface="Times New Roman" panose="02020603050405020304" pitchFamily="18" charset="0"/>
-                <a:cs typeface="Times New Roman" panose="02020603050405020304" pitchFamily="18" charset="0"/>
-              </a:rPr>
-              <a:t>const</a:t>
-            </a:r>
-            <a:r>
-              <a:rPr lang="pt-BR" sz="2000" dirty="0">
-                <a:solidFill>
-                  <a:schemeClr val="tx1"/>
-                </a:solidFill>
-                <a:latin typeface="Times New Roman" panose="02020603050405020304" pitchFamily="18" charset="0"/>
-                <a:cs typeface="Times New Roman" panose="02020603050405020304" pitchFamily="18" charset="0"/>
-              </a:rPr>
-              <a:t> </a:t>
-            </a:r>
-            <a:r>
-              <a:rPr lang="pt-BR" sz="2000" dirty="0" err="1">
-                <a:solidFill>
-                  <a:schemeClr val="tx1"/>
-                </a:solidFill>
-                <a:latin typeface="Times New Roman" panose="02020603050405020304" pitchFamily="18" charset="0"/>
-                <a:cs typeface="Times New Roman" panose="02020603050405020304" pitchFamily="18" charset="0"/>
-              </a:rPr>
-              <a:t>ajax</a:t>
-            </a:r>
-            <a:r>
-              <a:rPr lang="pt-BR" sz="2000" dirty="0">
-                <a:solidFill>
-                  <a:schemeClr val="tx1"/>
-                </a:solidFill>
-                <a:latin typeface="Times New Roman" panose="02020603050405020304" pitchFamily="18" charset="0"/>
-                <a:cs typeface="Times New Roman" panose="02020603050405020304" pitchFamily="18" charset="0"/>
-              </a:rPr>
-              <a:t> = </a:t>
-            </a:r>
-            <a:r>
-              <a:rPr lang="pt-BR" sz="2000" b="1" dirty="0">
-                <a:solidFill>
-                  <a:schemeClr val="tx1"/>
-                </a:solidFill>
-                <a:latin typeface="Times New Roman" panose="02020603050405020304" pitchFamily="18" charset="0"/>
-                <a:cs typeface="Times New Roman" panose="02020603050405020304" pitchFamily="18" charset="0"/>
-              </a:rPr>
-              <a:t>new</a:t>
-            </a:r>
-            <a:r>
-              <a:rPr lang="pt-BR" sz="2000" dirty="0">
-                <a:solidFill>
-                  <a:schemeClr val="tx1"/>
-                </a:solidFill>
-                <a:latin typeface="Times New Roman" panose="02020603050405020304" pitchFamily="18" charset="0"/>
-                <a:cs typeface="Times New Roman" panose="02020603050405020304" pitchFamily="18" charset="0"/>
-              </a:rPr>
-              <a:t> </a:t>
-            </a:r>
-            <a:r>
-              <a:rPr lang="pt-BR" sz="2000" b="1" dirty="0" err="1">
-                <a:solidFill>
-                  <a:srgbClr val="FF0000"/>
-                </a:solidFill>
-                <a:latin typeface="Times New Roman" panose="02020603050405020304" pitchFamily="18" charset="0"/>
-                <a:cs typeface="Times New Roman" panose="02020603050405020304" pitchFamily="18" charset="0"/>
-              </a:rPr>
-              <a:t>XMLHttpRequest</a:t>
-            </a:r>
-            <a:r>
-              <a:rPr lang="pt-BR" sz="2000" dirty="0">
-                <a:solidFill>
-                  <a:schemeClr val="tx1"/>
-                </a:solidFill>
-                <a:latin typeface="Times New Roman" panose="02020603050405020304" pitchFamily="18" charset="0"/>
-                <a:cs typeface="Times New Roman" panose="02020603050405020304" pitchFamily="18" charset="0"/>
-              </a:rPr>
-              <a:t>();</a:t>
-            </a:r>
-          </a:p>
-          <a:p>
-            <a:pPr marL="447675" lvl="1" indent="0" algn="just">
-              <a:buNone/>
-            </a:pPr>
-            <a:r>
-              <a:rPr lang="pt-BR" sz="2000" dirty="0" err="1">
-                <a:solidFill>
-                  <a:schemeClr val="tx1"/>
-                </a:solidFill>
-                <a:latin typeface="Times New Roman" panose="02020603050405020304" pitchFamily="18" charset="0"/>
-                <a:cs typeface="Times New Roman" panose="02020603050405020304" pitchFamily="18" charset="0"/>
-              </a:rPr>
-              <a:t>ajax.</a:t>
-            </a:r>
-            <a:r>
-              <a:rPr lang="pt-BR" sz="2000" b="1" dirty="0" err="1">
-                <a:solidFill>
-                  <a:srgbClr val="FF0000"/>
-                </a:solidFill>
-                <a:latin typeface="Times New Roman" panose="02020603050405020304" pitchFamily="18" charset="0"/>
-                <a:cs typeface="Times New Roman" panose="02020603050405020304" pitchFamily="18" charset="0"/>
-              </a:rPr>
-              <a:t>open</a:t>
-            </a:r>
-            <a:r>
-              <a:rPr lang="pt-BR" sz="2000" dirty="0">
-                <a:solidFill>
-                  <a:schemeClr val="tx1"/>
-                </a:solidFill>
-                <a:latin typeface="Times New Roman" panose="02020603050405020304" pitchFamily="18" charset="0"/>
-                <a:cs typeface="Times New Roman" panose="02020603050405020304" pitchFamily="18" charset="0"/>
-              </a:rPr>
-              <a:t>(‘GET’, ‘</a:t>
-            </a:r>
-            <a:r>
-              <a:rPr lang="pt-BR" sz="2000" b="1" dirty="0">
-                <a:solidFill>
-                  <a:schemeClr val="tx1"/>
-                </a:solidFill>
-                <a:latin typeface="Times New Roman" panose="02020603050405020304" pitchFamily="18" charset="0"/>
-                <a:cs typeface="Times New Roman" panose="02020603050405020304" pitchFamily="18" charset="0"/>
-              </a:rPr>
-              <a:t>https://viacep.com.br/ws/’ + </a:t>
-            </a:r>
-            <a:r>
-              <a:rPr lang="pt-BR" sz="2000" b="1" dirty="0" err="1">
-                <a:solidFill>
-                  <a:schemeClr val="tx1"/>
-                </a:solidFill>
-                <a:latin typeface="Times New Roman" panose="02020603050405020304" pitchFamily="18" charset="0"/>
-                <a:cs typeface="Times New Roman" panose="02020603050405020304" pitchFamily="18" charset="0"/>
-              </a:rPr>
-              <a:t>inputCEP</a:t>
-            </a:r>
-            <a:r>
-              <a:rPr lang="pt-BR" sz="2000" b="1" dirty="0">
-                <a:solidFill>
-                  <a:schemeClr val="tx1"/>
-                </a:solidFill>
-                <a:latin typeface="Times New Roman" panose="02020603050405020304" pitchFamily="18" charset="0"/>
-                <a:cs typeface="Times New Roman" panose="02020603050405020304" pitchFamily="18" charset="0"/>
-              </a:rPr>
-              <a:t> + ‘/</a:t>
-            </a:r>
-            <a:r>
-              <a:rPr lang="pt-BR" sz="2000" b="1" dirty="0" err="1">
-                <a:solidFill>
-                  <a:schemeClr val="tx1"/>
-                </a:solidFill>
-                <a:latin typeface="Times New Roman" panose="02020603050405020304" pitchFamily="18" charset="0"/>
-                <a:cs typeface="Times New Roman" panose="02020603050405020304" pitchFamily="18" charset="0"/>
-              </a:rPr>
-              <a:t>json</a:t>
-            </a:r>
-            <a:r>
-              <a:rPr lang="pt-BR" sz="2000" b="1" dirty="0">
-                <a:solidFill>
-                  <a:schemeClr val="tx1"/>
-                </a:solidFill>
-                <a:latin typeface="Times New Roman" panose="02020603050405020304" pitchFamily="18" charset="0"/>
-                <a:cs typeface="Times New Roman" panose="02020603050405020304" pitchFamily="18" charset="0"/>
-              </a:rPr>
-              <a:t>/’</a:t>
-            </a:r>
-            <a:r>
-              <a:rPr lang="pt-BR" sz="2000" dirty="0">
-                <a:solidFill>
-                  <a:schemeClr val="tx1"/>
-                </a:solidFill>
-                <a:latin typeface="Times New Roman" panose="02020603050405020304" pitchFamily="18" charset="0"/>
-                <a:cs typeface="Times New Roman" panose="02020603050405020304" pitchFamily="18" charset="0"/>
-              </a:rPr>
-              <a:t>);</a:t>
-            </a:r>
-          </a:p>
-          <a:p>
-            <a:pPr marL="447675" lvl="1" indent="0" algn="just">
-              <a:buNone/>
-            </a:pPr>
-            <a:r>
-              <a:rPr lang="pt-BR" sz="2000" dirty="0" err="1">
-                <a:solidFill>
-                  <a:schemeClr val="tx1"/>
-                </a:solidFill>
-                <a:latin typeface="Times New Roman" panose="02020603050405020304" pitchFamily="18" charset="0"/>
-                <a:cs typeface="Times New Roman" panose="02020603050405020304" pitchFamily="18" charset="0"/>
-              </a:rPr>
-              <a:t>ajax.</a:t>
-            </a:r>
-            <a:r>
-              <a:rPr lang="pt-BR" sz="2000" b="1" dirty="0" err="1">
-                <a:solidFill>
-                  <a:srgbClr val="FF0000"/>
-                </a:solidFill>
-                <a:latin typeface="Times New Roman" panose="02020603050405020304" pitchFamily="18" charset="0"/>
-                <a:cs typeface="Times New Roman" panose="02020603050405020304" pitchFamily="18" charset="0"/>
-              </a:rPr>
-              <a:t>send</a:t>
-            </a:r>
-            <a:r>
-              <a:rPr lang="pt-BR" sz="2000" dirty="0">
-                <a:solidFill>
-                  <a:schemeClr val="tx1"/>
-                </a:solidFill>
-                <a:latin typeface="Times New Roman" panose="02020603050405020304" pitchFamily="18" charset="0"/>
-                <a:cs typeface="Times New Roman" panose="02020603050405020304" pitchFamily="18" charset="0"/>
-              </a:rPr>
-              <a:t>(); </a:t>
-            </a:r>
-          </a:p>
-          <a:p>
-            <a:pPr marL="447675" lvl="1" indent="0" algn="just">
-              <a:buNone/>
-            </a:pPr>
-            <a:r>
-              <a:rPr lang="pt-BR" sz="2000" dirty="0" err="1">
-                <a:solidFill>
-                  <a:schemeClr val="tx1"/>
-                </a:solidFill>
-                <a:latin typeface="Times New Roman" panose="02020603050405020304" pitchFamily="18" charset="0"/>
-                <a:cs typeface="Times New Roman" panose="02020603050405020304" pitchFamily="18" charset="0"/>
-              </a:rPr>
-              <a:t>ajax.</a:t>
-            </a:r>
-            <a:r>
-              <a:rPr lang="pt-BR" sz="2000" b="1" dirty="0" err="1">
-                <a:solidFill>
-                  <a:srgbClr val="FF0000"/>
-                </a:solidFill>
-                <a:latin typeface="Times New Roman" panose="02020603050405020304" pitchFamily="18" charset="0"/>
-                <a:cs typeface="Times New Roman" panose="02020603050405020304" pitchFamily="18" charset="0"/>
-              </a:rPr>
-              <a:t>onload</a:t>
-            </a:r>
-            <a:r>
-              <a:rPr lang="pt-BR" sz="2000" dirty="0">
-                <a:solidFill>
-                  <a:schemeClr val="tx1"/>
-                </a:solidFill>
-                <a:latin typeface="Times New Roman" panose="02020603050405020304" pitchFamily="18" charset="0"/>
-                <a:cs typeface="Times New Roman" panose="02020603050405020304" pitchFamily="18" charset="0"/>
-              </a:rPr>
-              <a:t> = </a:t>
-            </a:r>
-            <a:r>
-              <a:rPr lang="pt-BR" sz="2000" b="1" dirty="0" err="1">
-                <a:solidFill>
-                  <a:schemeClr val="tx1"/>
-                </a:solidFill>
-                <a:latin typeface="Times New Roman" panose="02020603050405020304" pitchFamily="18" charset="0"/>
-                <a:cs typeface="Times New Roman" panose="02020603050405020304" pitchFamily="18" charset="0"/>
-              </a:rPr>
-              <a:t>function</a:t>
-            </a:r>
-            <a:r>
-              <a:rPr lang="pt-BR" sz="2000" dirty="0">
-                <a:solidFill>
-                  <a:schemeClr val="tx1"/>
-                </a:solidFill>
-                <a:latin typeface="Times New Roman" panose="02020603050405020304" pitchFamily="18" charset="0"/>
-                <a:cs typeface="Times New Roman" panose="02020603050405020304" pitchFamily="18" charset="0"/>
-              </a:rPr>
-              <a:t>(){  </a:t>
-            </a:r>
-          </a:p>
-          <a:p>
-            <a:pPr marL="447675" lvl="1" indent="0" algn="just">
-              <a:buNone/>
-            </a:pPr>
-            <a:r>
-              <a:rPr lang="pt-BR" sz="2000" b="1" dirty="0">
-                <a:solidFill>
-                  <a:schemeClr val="tx1"/>
-                </a:solidFill>
-                <a:latin typeface="Times New Roman" panose="02020603050405020304" pitchFamily="18" charset="0"/>
-                <a:cs typeface="Times New Roman" panose="02020603050405020304" pitchFamily="18" charset="0"/>
-              </a:rPr>
-              <a:t>	    </a:t>
-            </a:r>
-            <a:r>
-              <a:rPr lang="pt-BR" sz="2000" b="1" dirty="0" err="1">
-                <a:solidFill>
-                  <a:schemeClr val="tx1"/>
-                </a:solidFill>
-                <a:latin typeface="Times New Roman" panose="02020603050405020304" pitchFamily="18" charset="0"/>
-                <a:cs typeface="Times New Roman" panose="02020603050405020304" pitchFamily="18" charset="0"/>
-              </a:rPr>
-              <a:t>let</a:t>
-            </a:r>
-            <a:r>
-              <a:rPr lang="pt-BR" sz="2000" dirty="0">
-                <a:solidFill>
-                  <a:schemeClr val="tx1"/>
-                </a:solidFill>
-                <a:latin typeface="Times New Roman" panose="02020603050405020304" pitchFamily="18" charset="0"/>
-                <a:cs typeface="Times New Roman" panose="02020603050405020304" pitchFamily="18" charset="0"/>
-              </a:rPr>
-              <a:t> </a:t>
-            </a:r>
-            <a:r>
-              <a:rPr lang="pt-BR" sz="2000" b="1" dirty="0" err="1">
-                <a:solidFill>
-                  <a:srgbClr val="FF0000"/>
-                </a:solidFill>
-                <a:latin typeface="Times New Roman" panose="02020603050405020304" pitchFamily="18" charset="0"/>
-                <a:cs typeface="Times New Roman" panose="02020603050405020304" pitchFamily="18" charset="0"/>
-              </a:rPr>
-              <a:t>objCEP</a:t>
-            </a:r>
-            <a:r>
-              <a:rPr lang="pt-BR" sz="2000" dirty="0">
-                <a:solidFill>
-                  <a:schemeClr val="tx1"/>
-                </a:solidFill>
-                <a:latin typeface="Times New Roman" panose="02020603050405020304" pitchFamily="18" charset="0"/>
-                <a:cs typeface="Times New Roman" panose="02020603050405020304" pitchFamily="18" charset="0"/>
-              </a:rPr>
-              <a:t> = </a:t>
-            </a:r>
-            <a:r>
-              <a:rPr lang="pt-BR" sz="2000" b="1" dirty="0" err="1">
-                <a:solidFill>
-                  <a:schemeClr val="tx1"/>
-                </a:solidFill>
-                <a:latin typeface="Times New Roman" panose="02020603050405020304" pitchFamily="18" charset="0"/>
-                <a:cs typeface="Times New Roman" panose="02020603050405020304" pitchFamily="18" charset="0"/>
-              </a:rPr>
-              <a:t>JSON</a:t>
-            </a:r>
-            <a:r>
-              <a:rPr lang="pt-BR" sz="2000" dirty="0" err="1">
-                <a:solidFill>
-                  <a:schemeClr val="tx1"/>
-                </a:solidFill>
-                <a:latin typeface="Times New Roman" panose="02020603050405020304" pitchFamily="18" charset="0"/>
-                <a:cs typeface="Times New Roman" panose="02020603050405020304" pitchFamily="18" charset="0"/>
-              </a:rPr>
-              <a:t>.parse</a:t>
-            </a:r>
-            <a:r>
-              <a:rPr lang="pt-BR" sz="2000" dirty="0">
-                <a:solidFill>
-                  <a:schemeClr val="tx1"/>
-                </a:solidFill>
-                <a:latin typeface="Times New Roman" panose="02020603050405020304" pitchFamily="18" charset="0"/>
-                <a:cs typeface="Times New Roman" panose="02020603050405020304" pitchFamily="18" charset="0"/>
-              </a:rPr>
-              <a:t>(</a:t>
-            </a:r>
-            <a:r>
-              <a:rPr lang="pt-BR" sz="2000" b="1" dirty="0" err="1">
-                <a:solidFill>
-                  <a:schemeClr val="tx1"/>
-                </a:solidFill>
-                <a:latin typeface="Times New Roman" panose="02020603050405020304" pitchFamily="18" charset="0"/>
-                <a:cs typeface="Times New Roman" panose="02020603050405020304" pitchFamily="18" charset="0"/>
-              </a:rPr>
-              <a:t>this</a:t>
-            </a:r>
-            <a:r>
-              <a:rPr lang="pt-BR" sz="2000" dirty="0" err="1">
-                <a:solidFill>
-                  <a:schemeClr val="tx1"/>
-                </a:solidFill>
-                <a:latin typeface="Times New Roman" panose="02020603050405020304" pitchFamily="18" charset="0"/>
-                <a:cs typeface="Times New Roman" panose="02020603050405020304" pitchFamily="18" charset="0"/>
-              </a:rPr>
-              <a:t>.responseText</a:t>
-            </a:r>
-            <a:r>
-              <a:rPr lang="pt-BR" sz="2000" dirty="0">
-                <a:solidFill>
-                  <a:schemeClr val="tx1"/>
-                </a:solidFill>
-                <a:latin typeface="Times New Roman" panose="02020603050405020304" pitchFamily="18" charset="0"/>
-                <a:cs typeface="Times New Roman" panose="02020603050405020304" pitchFamily="18" charset="0"/>
-              </a:rPr>
-              <a:t>);</a:t>
-            </a:r>
-          </a:p>
-          <a:p>
-            <a:pPr marL="447675" lvl="1" indent="0" algn="just">
-              <a:buNone/>
-            </a:pPr>
-            <a:r>
-              <a:rPr lang="pt-BR" sz="2000" dirty="0">
-                <a:solidFill>
-                  <a:schemeClr val="tx1"/>
-                </a:solidFill>
-                <a:latin typeface="Times New Roman" panose="02020603050405020304" pitchFamily="18" charset="0"/>
-                <a:cs typeface="Times New Roman" panose="02020603050405020304" pitchFamily="18" charset="0"/>
-              </a:rPr>
-              <a:t>	    </a:t>
-            </a:r>
-            <a:r>
-              <a:rPr lang="pt-BR" sz="2000" b="1" dirty="0" err="1">
-                <a:solidFill>
-                  <a:schemeClr val="tx1"/>
-                </a:solidFill>
-                <a:latin typeface="Times New Roman" panose="02020603050405020304" pitchFamily="18" charset="0"/>
-                <a:cs typeface="Times New Roman" panose="02020603050405020304" pitchFamily="18" charset="0"/>
-              </a:rPr>
-              <a:t>let</a:t>
-            </a:r>
-            <a:r>
-              <a:rPr lang="pt-BR" sz="2000" dirty="0">
-                <a:solidFill>
-                  <a:schemeClr val="tx1"/>
-                </a:solidFill>
-                <a:latin typeface="Times New Roman" panose="02020603050405020304" pitchFamily="18" charset="0"/>
-                <a:cs typeface="Times New Roman" panose="02020603050405020304" pitchFamily="18" charset="0"/>
-              </a:rPr>
-              <a:t> </a:t>
-            </a:r>
-            <a:r>
-              <a:rPr lang="pt-BR" sz="2000" dirty="0" err="1">
-                <a:solidFill>
-                  <a:schemeClr val="tx1"/>
-                </a:solidFill>
-                <a:latin typeface="Times New Roman" panose="02020603050405020304" pitchFamily="18" charset="0"/>
-                <a:cs typeface="Times New Roman" panose="02020603050405020304" pitchFamily="18" charset="0"/>
-              </a:rPr>
-              <a:t>lograd</a:t>
-            </a:r>
-            <a:r>
-              <a:rPr lang="pt-BR" sz="2000" dirty="0">
-                <a:solidFill>
-                  <a:schemeClr val="tx1"/>
-                </a:solidFill>
-                <a:latin typeface="Times New Roman" panose="02020603050405020304" pitchFamily="18" charset="0"/>
-                <a:cs typeface="Times New Roman" panose="02020603050405020304" pitchFamily="18" charset="0"/>
-              </a:rPr>
-              <a:t> = </a:t>
-            </a:r>
-            <a:r>
-              <a:rPr lang="pt-BR" sz="2000" dirty="0" err="1">
-                <a:solidFill>
-                  <a:schemeClr val="tx1"/>
-                </a:solidFill>
-                <a:latin typeface="Times New Roman" panose="02020603050405020304" pitchFamily="18" charset="0"/>
-                <a:cs typeface="Times New Roman" panose="02020603050405020304" pitchFamily="18" charset="0"/>
-              </a:rPr>
-              <a:t>objCEP.logradouro</a:t>
-            </a:r>
-            <a:r>
-              <a:rPr lang="pt-BR" sz="2000" dirty="0">
-                <a:solidFill>
-                  <a:schemeClr val="tx1"/>
-                </a:solidFill>
-                <a:latin typeface="Times New Roman" panose="02020603050405020304" pitchFamily="18" charset="0"/>
-                <a:cs typeface="Times New Roman" panose="02020603050405020304" pitchFamily="18" charset="0"/>
-              </a:rPr>
-              <a:t>; </a:t>
-            </a:r>
-            <a:r>
-              <a:rPr lang="pt-BR" sz="2000" b="1" dirty="0" err="1">
-                <a:solidFill>
-                  <a:schemeClr val="tx1"/>
-                </a:solidFill>
-                <a:latin typeface="Times New Roman" panose="02020603050405020304" pitchFamily="18" charset="0"/>
-                <a:cs typeface="Times New Roman" panose="02020603050405020304" pitchFamily="18" charset="0"/>
-              </a:rPr>
-              <a:t>let</a:t>
-            </a:r>
-            <a:r>
-              <a:rPr lang="pt-BR" sz="2000" dirty="0">
-                <a:solidFill>
-                  <a:schemeClr val="tx1"/>
-                </a:solidFill>
-                <a:latin typeface="Times New Roman" panose="02020603050405020304" pitchFamily="18" charset="0"/>
-                <a:cs typeface="Times New Roman" panose="02020603050405020304" pitchFamily="18" charset="0"/>
-              </a:rPr>
-              <a:t> cidade = </a:t>
-            </a:r>
-            <a:r>
-              <a:rPr lang="pt-BR" sz="2000" dirty="0" err="1">
-                <a:solidFill>
-                  <a:schemeClr val="tx1"/>
-                </a:solidFill>
-                <a:latin typeface="Times New Roman" panose="02020603050405020304" pitchFamily="18" charset="0"/>
-                <a:cs typeface="Times New Roman" panose="02020603050405020304" pitchFamily="18" charset="0"/>
-              </a:rPr>
-              <a:t>objCEP.bairro</a:t>
-            </a:r>
-            <a:r>
-              <a:rPr lang="pt-BR" sz="2000" dirty="0">
-                <a:solidFill>
-                  <a:schemeClr val="tx1"/>
-                </a:solidFill>
-                <a:latin typeface="Times New Roman" panose="02020603050405020304" pitchFamily="18" charset="0"/>
-                <a:cs typeface="Times New Roman" panose="02020603050405020304" pitchFamily="18" charset="0"/>
-              </a:rPr>
-              <a:t>; </a:t>
-            </a:r>
-          </a:p>
-          <a:p>
-            <a:pPr marL="447675" lvl="1" indent="0" algn="just">
-              <a:buNone/>
-            </a:pPr>
-            <a:r>
-              <a:rPr lang="pt-BR" sz="2000" dirty="0">
-                <a:solidFill>
-                  <a:schemeClr val="tx1"/>
-                </a:solidFill>
-                <a:latin typeface="Times New Roman" panose="02020603050405020304" pitchFamily="18" charset="0"/>
-                <a:cs typeface="Times New Roman" panose="02020603050405020304" pitchFamily="18" charset="0"/>
-              </a:rPr>
-              <a:t>	    </a:t>
-            </a:r>
-            <a:r>
-              <a:rPr lang="pt-BR" sz="2000" b="1" dirty="0" err="1">
-                <a:solidFill>
-                  <a:schemeClr val="tx1"/>
-                </a:solidFill>
-                <a:latin typeface="Times New Roman" panose="02020603050405020304" pitchFamily="18" charset="0"/>
-                <a:cs typeface="Times New Roman" panose="02020603050405020304" pitchFamily="18" charset="0"/>
-              </a:rPr>
-              <a:t>let</a:t>
-            </a:r>
-            <a:r>
-              <a:rPr lang="pt-BR" sz="2000" dirty="0">
-                <a:solidFill>
-                  <a:schemeClr val="tx1"/>
-                </a:solidFill>
-                <a:latin typeface="Times New Roman" panose="02020603050405020304" pitchFamily="18" charset="0"/>
-                <a:cs typeface="Times New Roman" panose="02020603050405020304" pitchFamily="18" charset="0"/>
-              </a:rPr>
-              <a:t> uf = </a:t>
-            </a:r>
-            <a:r>
-              <a:rPr lang="pt-BR" sz="2000" dirty="0" err="1">
-                <a:solidFill>
-                  <a:schemeClr val="tx1"/>
-                </a:solidFill>
-                <a:latin typeface="Times New Roman" panose="02020603050405020304" pitchFamily="18" charset="0"/>
-                <a:cs typeface="Times New Roman" panose="02020603050405020304" pitchFamily="18" charset="0"/>
-              </a:rPr>
-              <a:t>objCEP.uf</a:t>
-            </a:r>
-            <a:r>
-              <a:rPr lang="pt-BR" sz="2000" dirty="0">
-                <a:solidFill>
-                  <a:schemeClr val="tx1"/>
-                </a:solidFill>
-                <a:latin typeface="Times New Roman" panose="02020603050405020304" pitchFamily="18" charset="0"/>
-                <a:cs typeface="Times New Roman" panose="02020603050405020304" pitchFamily="18" charset="0"/>
-              </a:rPr>
-              <a:t>;</a:t>
-            </a:r>
-          </a:p>
-          <a:p>
-            <a:pPr marL="447675" lvl="1" indent="0" algn="just">
-              <a:buNone/>
-            </a:pPr>
-            <a:r>
-              <a:rPr lang="pt-BR" sz="2000" dirty="0">
-                <a:solidFill>
-                  <a:schemeClr val="tx1"/>
-                </a:solidFill>
-                <a:latin typeface="Times New Roman" panose="02020603050405020304" pitchFamily="18" charset="0"/>
-                <a:cs typeface="Times New Roman" panose="02020603050405020304" pitchFamily="18" charset="0"/>
-              </a:rPr>
-              <a:t>	    </a:t>
-            </a:r>
-            <a:r>
-              <a:rPr lang="pt-BR" sz="2000" b="1" dirty="0" err="1">
-                <a:solidFill>
-                  <a:schemeClr val="tx1"/>
-                </a:solidFill>
-                <a:latin typeface="Times New Roman" panose="02020603050405020304" pitchFamily="18" charset="0"/>
-                <a:cs typeface="Times New Roman" panose="02020603050405020304" pitchFamily="18" charset="0"/>
-              </a:rPr>
-              <a:t>document</a:t>
-            </a:r>
-            <a:r>
-              <a:rPr lang="pt-BR" sz="2000" dirty="0" err="1">
-                <a:solidFill>
-                  <a:schemeClr val="tx1"/>
-                </a:solidFill>
-                <a:latin typeface="Times New Roman" panose="02020603050405020304" pitchFamily="18" charset="0"/>
-                <a:cs typeface="Times New Roman" panose="02020603050405020304" pitchFamily="18" charset="0"/>
-              </a:rPr>
-              <a:t>.</a:t>
-            </a:r>
-            <a:r>
-              <a:rPr lang="pt-BR" sz="2000" b="1" dirty="0" err="1">
-                <a:solidFill>
-                  <a:srgbClr val="FF0000"/>
-                </a:solidFill>
-                <a:latin typeface="Times New Roman" panose="02020603050405020304" pitchFamily="18" charset="0"/>
-                <a:cs typeface="Times New Roman" panose="02020603050405020304" pitchFamily="18" charset="0"/>
-              </a:rPr>
-              <a:t>getElementById</a:t>
-            </a:r>
-            <a:r>
-              <a:rPr lang="pt-BR" sz="2000" dirty="0">
-                <a:solidFill>
-                  <a:schemeClr val="tx1"/>
-                </a:solidFill>
-                <a:latin typeface="Times New Roman" panose="02020603050405020304" pitchFamily="18" charset="0"/>
-                <a:cs typeface="Times New Roman" panose="02020603050405020304" pitchFamily="18" charset="0"/>
-              </a:rPr>
-              <a:t>(“</a:t>
-            </a:r>
-            <a:r>
-              <a:rPr lang="pt-BR" sz="2000" b="1" dirty="0" err="1">
-                <a:solidFill>
-                  <a:schemeClr val="tx1"/>
-                </a:solidFill>
-                <a:latin typeface="Times New Roman" panose="02020603050405020304" pitchFamily="18" charset="0"/>
-                <a:cs typeface="Times New Roman" panose="02020603050405020304" pitchFamily="18" charset="0"/>
-              </a:rPr>
-              <a:t>Idparag</a:t>
-            </a:r>
-            <a:r>
-              <a:rPr lang="pt-BR" sz="2000" dirty="0">
-                <a:solidFill>
-                  <a:schemeClr val="tx1"/>
-                </a:solidFill>
-                <a:latin typeface="Times New Roman" panose="02020603050405020304" pitchFamily="18" charset="0"/>
-                <a:cs typeface="Times New Roman" panose="02020603050405020304" pitchFamily="18" charset="0"/>
-              </a:rPr>
-              <a:t>”).</a:t>
-            </a:r>
-            <a:r>
-              <a:rPr lang="pt-BR" sz="2000" dirty="0" err="1">
-                <a:solidFill>
-                  <a:schemeClr val="tx1"/>
-                </a:solidFill>
-                <a:latin typeface="Times New Roman" panose="02020603050405020304" pitchFamily="18" charset="0"/>
-                <a:cs typeface="Times New Roman" panose="02020603050405020304" pitchFamily="18" charset="0"/>
-              </a:rPr>
-              <a:t>innerHTML</a:t>
-            </a:r>
-            <a:r>
-              <a:rPr lang="pt-BR" sz="2000" dirty="0">
-                <a:solidFill>
-                  <a:schemeClr val="tx1"/>
-                </a:solidFill>
-                <a:latin typeface="Times New Roman" panose="02020603050405020304" pitchFamily="18" charset="0"/>
-                <a:cs typeface="Times New Roman" panose="02020603050405020304" pitchFamily="18" charset="0"/>
-              </a:rPr>
-              <a:t> = </a:t>
-            </a:r>
-            <a:r>
-              <a:rPr lang="pt-BR" sz="2000" dirty="0" err="1">
-                <a:solidFill>
-                  <a:schemeClr val="tx1"/>
-                </a:solidFill>
-                <a:latin typeface="Times New Roman" panose="02020603050405020304" pitchFamily="18" charset="0"/>
-                <a:cs typeface="Times New Roman" panose="02020603050405020304" pitchFamily="18" charset="0"/>
-              </a:rPr>
-              <a:t>lograd</a:t>
-            </a:r>
-            <a:r>
-              <a:rPr lang="pt-BR" sz="2000" dirty="0">
-                <a:solidFill>
-                  <a:schemeClr val="tx1"/>
-                </a:solidFill>
-                <a:latin typeface="Times New Roman" panose="02020603050405020304" pitchFamily="18" charset="0"/>
-                <a:cs typeface="Times New Roman" panose="02020603050405020304" pitchFamily="18" charset="0"/>
-              </a:rPr>
-              <a:t> + bairro + uf;}</a:t>
+              <a:t> + bairro + uf;}}</a:t>
             </a:r>
           </a:p>
         </p:txBody>
@@ -21310,6 +21255,16 @@
               <a:t>createElement</a:t>
             </a:r>
             <a:r>
+              <a:rPr lang="pt-BR" sz="2000">
+                <a:solidFill>
+                  <a:schemeClr val="tx1"/>
+                </a:solidFill>
+                <a:latin typeface="Times New Roman" panose="02020603050405020304" pitchFamily="18" charset="0"/>
+                <a:cs typeface="Times New Roman" panose="02020603050405020304" pitchFamily="18" charset="0"/>
+              </a:rPr>
+              <a:t>('h1</a:t>
+            </a:r>
+            <a:r>
               <a:rPr lang="pt-BR" sz="2000" dirty="0">
                 <a:solidFill>
                   <a:schemeClr val="tx1"/>
@@ -21317,7 +21272,7 @@
                 <a:latin typeface="Times New Roman" panose="02020603050405020304" pitchFamily="18" charset="0"/>
                 <a:cs typeface="Times New Roman" panose="02020603050405020304" pitchFamily="18" charset="0"/>
               </a:rPr>
-              <a:t>(‘h1');</a:t>
+              <a:t>');</a:t>
             </a:r>
           </a:p>
           <a:p>
@@ -21342,7 +21297,7 @@
                 <a:latin typeface="Times New Roman" panose="02020603050405020304" pitchFamily="18" charset="0"/>
                 <a:cs typeface="Times New Roman" panose="02020603050405020304" pitchFamily="18" charset="0"/>
               </a:rPr>
-              <a:t>.innerHTML = ‘Texto’;</a:t>
+              <a:t>.innerHTML = 'Texto';</a:t>
             </a:r>
           </a:p>
           <a:p>
@@ -21387,7 +21342,7 @@
                 <a:latin typeface="Times New Roman" panose="02020603050405020304" pitchFamily="18" charset="0"/>
                 <a:cs typeface="Times New Roman" panose="02020603050405020304" pitchFamily="18" charset="0"/>
               </a:rPr>
-              <a:t>('id', ‘idH1');</a:t>
+              <a:t>('id', 'idH1');</a:t>
             </a:r>
           </a:p>
           <a:p>
@@ -23067,7 +23022,7 @@
                   <a:schemeClr val="bg1"/>
                 </a:solidFill>
               </a:rPr>
-              <a:t>Desenvolvimento de Software</a:t>
+              <a:t>Desenvolvimento de Software </a:t>
             </a:r>
             <a:br>
               <a:rPr lang="pt-BR" sz="4800" b="1" dirty="0">

</xml_diff>